<commit_message>
A few more modifications
</commit_message>
<xml_diff>
--- a/CaseManagement/case_mgmt.pptx
+++ b/CaseManagement/case_mgmt.pptx
@@ -5,17 +5,23 @@
     <p:sldMasterId id="2147483648" r:id="rId1"/>
   </p:sldMasterIdLst>
   <p:notesMasterIdLst>
-    <p:notesMasterId r:id="rId7"/>
+    <p:notesMasterId r:id="rId13"/>
   </p:notesMasterIdLst>
   <p:handoutMasterIdLst>
-    <p:handoutMasterId r:id="rId8"/>
+    <p:handoutMasterId r:id="rId14"/>
   </p:handoutMasterIdLst>
   <p:sldIdLst>
     <p:sldId id="258" r:id="rId2"/>
     <p:sldId id="259" r:id="rId3"/>
     <p:sldId id="260" r:id="rId4"/>
-    <p:sldId id="262" r:id="rId5"/>
-    <p:sldId id="261" r:id="rId6"/>
+    <p:sldId id="263" r:id="rId5"/>
+    <p:sldId id="264" r:id="rId6"/>
+    <p:sldId id="265" r:id="rId7"/>
+    <p:sldId id="266" r:id="rId8"/>
+    <p:sldId id="267" r:id="rId9"/>
+    <p:sldId id="268" r:id="rId10"/>
+    <p:sldId id="262" r:id="rId11"/>
+    <p:sldId id="261" r:id="rId12"/>
   </p:sldIdLst>
   <p:sldSz cx="9144000" cy="6858000" type="screen4x3"/>
   <p:notesSz cx="6858000" cy="9296400"/>
@@ -310,7 +316,7 @@
               <a:pPr>
                 <a:defRPr/>
               </a:pPr>
-              <a:t>11/26/15</a:t>
+              <a:t>11/29/15</a:t>
             </a:fld>
             <a:endParaRPr lang="en-US"/>
           </a:p>
@@ -522,7 +528,7 @@
               <a:pPr>
                 <a:defRPr/>
               </a:pPr>
-              <a:t>11/26/15</a:t>
+              <a:t>11/29/15</a:t>
             </a:fld>
             <a:endParaRPr lang="en-US"/>
           </a:p>
@@ -974,15 +980,7 @@
           <a:p>
             <a:r>
               <a:rPr lang="en-US" dirty="0" smtClean="0"/>
-              <a:t>Explain each of the</a:t>
-            </a:r>
-            <a:r>
-              <a:rPr lang="en-US" baseline="0" dirty="0" smtClean="0"/>
-              <a:t> concepts with drawings. </a:t>
-            </a:r>
-            <a:r>
-              <a:rPr lang="en-US" baseline="0" smtClean="0"/>
-              <a:t>Bring up case closures`</a:t>
+              <a:t>Ask audience</a:t>
             </a:r>
             <a:endParaRPr lang="en-US" dirty="0"/>
           </a:p>
@@ -1011,6 +1009,108 @@
               <a:pPr>
                 <a:defRPr/>
               </a:pPr>
+              <a:t>1</a:t>
+            </a:fld>
+            <a:endParaRPr lang="en-US"/>
+          </a:p>
+        </p:txBody>
+      </p:sp>
+    </p:spTree>
+    <p:extLst>
+      <p:ext uri="{BB962C8B-B14F-4D97-AF65-F5344CB8AC3E}">
+        <p14:creationId xmlns:p14="http://schemas.microsoft.com/office/powerpoint/2010/main" val="65558116"/>
+      </p:ext>
+    </p:extLst>
+  </p:cSld>
+  <p:clrMapOvr>
+    <a:masterClrMapping/>
+  </p:clrMapOvr>
+</p:notes>
+</file>
+
+<file path=ppt/notesSlides/notesSlide3.xml><?xml version="1.0" encoding="utf-8"?>
+<p:notes xmlns:a="http://schemas.openxmlformats.org/drawingml/2006/main" xmlns:r="http://schemas.openxmlformats.org/officeDocument/2006/relationships" xmlns:p="http://schemas.openxmlformats.org/presentationml/2006/main">
+  <p:cSld>
+    <p:spTree>
+      <p:nvGrpSpPr>
+        <p:cNvPr id="1" name=""/>
+        <p:cNvGrpSpPr/>
+        <p:nvPr/>
+      </p:nvGrpSpPr>
+      <p:grpSpPr>
+        <a:xfrm>
+          <a:off x="0" y="0"/>
+          <a:ext cx="0" cy="0"/>
+          <a:chOff x="0" y="0"/>
+          <a:chExt cx="0" cy="0"/>
+        </a:xfrm>
+      </p:grpSpPr>
+      <p:sp>
+        <p:nvSpPr>
+          <p:cNvPr id="2" name="Slide Image Placeholder 1"/>
+          <p:cNvSpPr>
+            <a:spLocks noGrp="1" noRot="1" noChangeAspect="1"/>
+          </p:cNvSpPr>
+          <p:nvPr>
+            <p:ph type="sldImg"/>
+          </p:nvPr>
+        </p:nvSpPr>
+        <p:spPr/>
+      </p:sp>
+      <p:sp>
+        <p:nvSpPr>
+          <p:cNvPr id="3" name="Notes Placeholder 2"/>
+          <p:cNvSpPr>
+            <a:spLocks noGrp="1"/>
+          </p:cNvSpPr>
+          <p:nvPr>
+            <p:ph type="body" idx="1"/>
+          </p:nvPr>
+        </p:nvSpPr>
+        <p:spPr/>
+        <p:txBody>
+          <a:bodyPr/>
+          <a:lstStyle/>
+          <a:p>
+            <a:r>
+              <a:rPr lang="en-US" dirty="0" smtClean="0"/>
+              <a:t>Explain each of the</a:t>
+            </a:r>
+            <a:r>
+              <a:rPr lang="en-US" baseline="0" dirty="0" smtClean="0"/>
+              <a:t> concepts with drawings. </a:t>
+            </a:r>
+            <a:r>
+              <a:rPr lang="en-US" baseline="0" smtClean="0"/>
+              <a:t>Bring up case closures`</a:t>
+            </a:r>
+            <a:endParaRPr lang="en-US" dirty="0"/>
+          </a:p>
+        </p:txBody>
+      </p:sp>
+      <p:sp>
+        <p:nvSpPr>
+          <p:cNvPr id="4" name="Slide Number Placeholder 3"/>
+          <p:cNvSpPr>
+            <a:spLocks noGrp="1"/>
+          </p:cNvSpPr>
+          <p:nvPr>
+            <p:ph type="sldNum" sz="quarter" idx="10"/>
+          </p:nvPr>
+        </p:nvSpPr>
+        <p:spPr/>
+        <p:txBody>
+          <a:bodyPr/>
+          <a:lstStyle/>
+          <a:p>
+            <a:pPr>
+              <a:defRPr/>
+            </a:pPr>
+            <a:fld id="{307EBDA9-1523-4B97-AE6B-A78B2B72B3F3}" type="slidenum">
+              <a:rPr lang="en-US" smtClean="0"/>
+              <a:pPr>
+                <a:defRPr/>
+              </a:pPr>
               <a:t>2</a:t>
             </a:fld>
             <a:endParaRPr lang="en-US"/>
@@ -1021,6 +1121,198 @@
     <p:extLst>
       <p:ext uri="{BB962C8B-B14F-4D97-AF65-F5344CB8AC3E}">
         <p14:creationId xmlns:p14="http://schemas.microsoft.com/office/powerpoint/2010/main" val="516747871"/>
+      </p:ext>
+    </p:extLst>
+  </p:cSld>
+  <p:clrMapOvr>
+    <a:masterClrMapping/>
+  </p:clrMapOvr>
+</p:notes>
+</file>
+
+<file path=ppt/notesSlides/notesSlide4.xml><?xml version="1.0" encoding="utf-8"?>
+<p:notes xmlns:a="http://schemas.openxmlformats.org/drawingml/2006/main" xmlns:r="http://schemas.openxmlformats.org/officeDocument/2006/relationships" xmlns:p="http://schemas.openxmlformats.org/presentationml/2006/main">
+  <p:cSld>
+    <p:spTree>
+      <p:nvGrpSpPr>
+        <p:cNvPr id="1" name=""/>
+        <p:cNvGrpSpPr/>
+        <p:nvPr/>
+      </p:nvGrpSpPr>
+      <p:grpSpPr>
+        <a:xfrm>
+          <a:off x="0" y="0"/>
+          <a:ext cx="0" cy="0"/>
+          <a:chOff x="0" y="0"/>
+          <a:chExt cx="0" cy="0"/>
+        </a:xfrm>
+      </p:grpSpPr>
+      <p:sp>
+        <p:nvSpPr>
+          <p:cNvPr id="2" name="Slide Image Placeholder 1"/>
+          <p:cNvSpPr>
+            <a:spLocks noGrp="1" noRot="1" noChangeAspect="1"/>
+          </p:cNvSpPr>
+          <p:nvPr>
+            <p:ph type="sldImg"/>
+          </p:nvPr>
+        </p:nvSpPr>
+        <p:spPr/>
+      </p:sp>
+      <p:sp>
+        <p:nvSpPr>
+          <p:cNvPr id="3" name="Notes Placeholder 2"/>
+          <p:cNvSpPr>
+            <a:spLocks noGrp="1"/>
+          </p:cNvSpPr>
+          <p:nvPr>
+            <p:ph type="body" idx="1"/>
+          </p:nvPr>
+        </p:nvSpPr>
+        <p:spPr/>
+        <p:txBody>
+          <a:bodyPr/>
+          <a:lstStyle/>
+          <a:p>
+            <a:r>
+              <a:rPr lang="en-US" dirty="0" smtClean="0"/>
+              <a:t>Discuss</a:t>
+            </a:r>
+            <a:r>
+              <a:rPr lang="en-US" baseline="0" dirty="0" smtClean="0"/>
+              <a:t> how cases actually work</a:t>
+            </a:r>
+            <a:endParaRPr lang="en-US" dirty="0"/>
+          </a:p>
+        </p:txBody>
+      </p:sp>
+      <p:sp>
+        <p:nvSpPr>
+          <p:cNvPr id="4" name="Slide Number Placeholder 3"/>
+          <p:cNvSpPr>
+            <a:spLocks noGrp="1"/>
+          </p:cNvSpPr>
+          <p:nvPr>
+            <p:ph type="sldNum" sz="quarter" idx="10"/>
+          </p:nvPr>
+        </p:nvSpPr>
+        <p:spPr/>
+        <p:txBody>
+          <a:bodyPr/>
+          <a:lstStyle/>
+          <a:p>
+            <a:pPr>
+              <a:defRPr/>
+            </a:pPr>
+            <a:fld id="{307EBDA9-1523-4B97-AE6B-A78B2B72B3F3}" type="slidenum">
+              <a:rPr lang="en-US" smtClean="0"/>
+              <a:pPr>
+                <a:defRPr/>
+              </a:pPr>
+              <a:t>3</a:t>
+            </a:fld>
+            <a:endParaRPr lang="en-US"/>
+          </a:p>
+        </p:txBody>
+      </p:sp>
+    </p:spTree>
+    <p:extLst>
+      <p:ext uri="{BB962C8B-B14F-4D97-AF65-F5344CB8AC3E}">
+        <p14:creationId xmlns:p14="http://schemas.microsoft.com/office/powerpoint/2010/main" val="1772161766"/>
+      </p:ext>
+    </p:extLst>
+  </p:cSld>
+  <p:clrMapOvr>
+    <a:masterClrMapping/>
+  </p:clrMapOvr>
+</p:notes>
+</file>
+
+<file path=ppt/notesSlides/notesSlide5.xml><?xml version="1.0" encoding="utf-8"?>
+<p:notes xmlns:a="http://schemas.openxmlformats.org/drawingml/2006/main" xmlns:r="http://schemas.openxmlformats.org/officeDocument/2006/relationships" xmlns:p="http://schemas.openxmlformats.org/presentationml/2006/main">
+  <p:cSld>
+    <p:spTree>
+      <p:nvGrpSpPr>
+        <p:cNvPr id="1" name=""/>
+        <p:cNvGrpSpPr/>
+        <p:nvPr/>
+      </p:nvGrpSpPr>
+      <p:grpSpPr>
+        <a:xfrm>
+          <a:off x="0" y="0"/>
+          <a:ext cx="0" cy="0"/>
+          <a:chOff x="0" y="0"/>
+          <a:chExt cx="0" cy="0"/>
+        </a:xfrm>
+      </p:grpSpPr>
+      <p:sp>
+        <p:nvSpPr>
+          <p:cNvPr id="2" name="Slide Image Placeholder 1"/>
+          <p:cNvSpPr>
+            <a:spLocks noGrp="1" noRot="1" noChangeAspect="1"/>
+          </p:cNvSpPr>
+          <p:nvPr>
+            <p:ph type="sldImg"/>
+          </p:nvPr>
+        </p:nvSpPr>
+        <p:spPr/>
+      </p:sp>
+      <p:sp>
+        <p:nvSpPr>
+          <p:cNvPr id="3" name="Notes Placeholder 2"/>
+          <p:cNvSpPr>
+            <a:spLocks noGrp="1"/>
+          </p:cNvSpPr>
+          <p:nvPr>
+            <p:ph type="body" idx="1"/>
+          </p:nvPr>
+        </p:nvSpPr>
+        <p:spPr/>
+        <p:txBody>
+          <a:bodyPr/>
+          <a:lstStyle/>
+          <a:p>
+            <a:r>
+              <a:rPr lang="en-US" dirty="0" smtClean="0"/>
+              <a:t>Setup basic case management</a:t>
+            </a:r>
+            <a:endParaRPr lang="en-US" dirty="0"/>
+          </a:p>
+        </p:txBody>
+      </p:sp>
+      <p:sp>
+        <p:nvSpPr>
+          <p:cNvPr id="4" name="Slide Number Placeholder 3"/>
+          <p:cNvSpPr>
+            <a:spLocks noGrp="1"/>
+          </p:cNvSpPr>
+          <p:nvPr>
+            <p:ph type="sldNum" sz="quarter" idx="10"/>
+          </p:nvPr>
+        </p:nvSpPr>
+        <p:spPr/>
+        <p:txBody>
+          <a:bodyPr/>
+          <a:lstStyle/>
+          <a:p>
+            <a:pPr>
+              <a:defRPr/>
+            </a:pPr>
+            <a:fld id="{307EBDA9-1523-4B97-AE6B-A78B2B72B3F3}" type="slidenum">
+              <a:rPr lang="en-US" smtClean="0"/>
+              <a:pPr>
+                <a:defRPr/>
+              </a:pPr>
+              <a:t>9</a:t>
+            </a:fld>
+            <a:endParaRPr lang="en-US"/>
+          </a:p>
+        </p:txBody>
+      </p:sp>
+    </p:spTree>
+    <p:extLst>
+      <p:ext uri="{BB962C8B-B14F-4D97-AF65-F5344CB8AC3E}">
+        <p14:creationId xmlns:p14="http://schemas.microsoft.com/office/powerpoint/2010/main" val="1238673357"/>
       </p:ext>
     </p:extLst>
   </p:cSld>
@@ -2561,9 +2853,6 @@
               </a:rPr>
               <a:t> </a:t>
             </a:r>
-            <a:endParaRPr lang="en-US" sz="2800" dirty="0" smtClean="0">
-              <a:ea typeface="ＭＳ Ｐゴシック" pitchFamily="34" charset="-128"/>
-            </a:endParaRPr>
           </a:p>
           <a:p>
             <a:pPr algn="ctr"/>
@@ -2591,6 +2880,252 @@
       </p:par>
     </p:tnLst>
   </p:timing>
+</p:sld>
+</file>
+
+<file path=ppt/slides/slide10.xml><?xml version="1.0" encoding="utf-8"?>
+<p:sld xmlns:a="http://schemas.openxmlformats.org/drawingml/2006/main" xmlns:r="http://schemas.openxmlformats.org/officeDocument/2006/relationships" xmlns:p="http://schemas.openxmlformats.org/presentationml/2006/main">
+  <p:cSld>
+    <p:spTree>
+      <p:nvGrpSpPr>
+        <p:cNvPr id="1" name=""/>
+        <p:cNvGrpSpPr/>
+        <p:nvPr/>
+      </p:nvGrpSpPr>
+      <p:grpSpPr>
+        <a:xfrm>
+          <a:off x="0" y="0"/>
+          <a:ext cx="0" cy="0"/>
+          <a:chOff x="0" y="0"/>
+          <a:chExt cx="0" cy="0"/>
+        </a:xfrm>
+      </p:grpSpPr>
+      <p:sp>
+        <p:nvSpPr>
+          <p:cNvPr id="2" name="Title 1"/>
+          <p:cNvSpPr>
+            <a:spLocks noGrp="1"/>
+          </p:cNvSpPr>
+          <p:nvPr>
+            <p:ph type="title"/>
+          </p:nvPr>
+        </p:nvSpPr>
+        <p:spPr>
+          <a:xfrm>
+            <a:off x="445169" y="3031962"/>
+            <a:ext cx="8229600" cy="457200"/>
+          </a:xfrm>
+        </p:spPr>
+        <p:txBody>
+          <a:bodyPr/>
+          <a:lstStyle/>
+          <a:p>
+            <a:pPr algn="ctr"/>
+            <a:r>
+              <a:rPr lang="en-US" dirty="0" smtClean="0"/>
+              <a:t>Let’s look at </a:t>
+            </a:r>
+            <a:r>
+              <a:rPr lang="en-US" dirty="0" smtClean="0"/>
+              <a:t>HQ</a:t>
+            </a:r>
+            <a:br>
+              <a:rPr lang="en-US" dirty="0" smtClean="0"/>
+            </a:br>
+            <a:r>
+              <a:rPr lang="en-US" dirty="0"/>
+              <a:t/>
+            </a:r>
+            <a:br>
+              <a:rPr lang="en-US" dirty="0"/>
+            </a:br>
+            <a:r>
+              <a:rPr lang="en-US" sz="1400" dirty="0"/>
+              <a:t> https://</a:t>
+            </a:r>
+            <a:r>
+              <a:rPr lang="en-US" sz="1400" dirty="0" err="1" smtClean="0"/>
+              <a:t>www.commcarehq.org</a:t>
+            </a:r>
+            <a:r>
+              <a:rPr lang="en-US" sz="1400" dirty="0" smtClean="0"/>
+              <a:t>/a/</a:t>
+            </a:r>
+            <a:r>
+              <a:rPr lang="en-US" sz="1400" dirty="0" err="1" smtClean="0"/>
+              <a:t>exi</a:t>
+            </a:r>
+            <a:r>
+              <a:rPr lang="en-US" sz="1400" dirty="0" smtClean="0"/>
+              <a:t>-training/apps/view/841cb462e89c6bd0e4d0038b4a97367c/modules-0/</a:t>
+            </a:r>
+            <a:r>
+              <a:rPr lang="en-US" sz="1000" dirty="0" smtClean="0"/>
+              <a:t/>
+            </a:r>
+            <a:br>
+              <a:rPr lang="en-US" sz="1000" dirty="0" smtClean="0"/>
+            </a:br>
+            <a:endParaRPr lang="en-US" sz="1000" dirty="0"/>
+          </a:p>
+        </p:txBody>
+      </p:sp>
+    </p:spTree>
+    <p:extLst>
+      <p:ext uri="{BB962C8B-B14F-4D97-AF65-F5344CB8AC3E}">
+        <p14:creationId xmlns:p14="http://schemas.microsoft.com/office/powerpoint/2010/main" val="1223942617"/>
+      </p:ext>
+    </p:extLst>
+  </p:cSld>
+  <p:clrMapOvr>
+    <a:masterClrMapping/>
+  </p:clrMapOvr>
+</p:sld>
+</file>
+
+<file path=ppt/slides/slide11.xml><?xml version="1.0" encoding="utf-8"?>
+<p:sld xmlns:a="http://schemas.openxmlformats.org/drawingml/2006/main" xmlns:r="http://schemas.openxmlformats.org/officeDocument/2006/relationships" xmlns:p="http://schemas.openxmlformats.org/presentationml/2006/main">
+  <p:cSld>
+    <p:spTree>
+      <p:nvGrpSpPr>
+        <p:cNvPr id="1" name=""/>
+        <p:cNvGrpSpPr/>
+        <p:nvPr/>
+      </p:nvGrpSpPr>
+      <p:grpSpPr>
+        <a:xfrm>
+          <a:off x="0" y="0"/>
+          <a:ext cx="0" cy="0"/>
+          <a:chOff x="0" y="0"/>
+          <a:chExt cx="0" cy="0"/>
+        </a:xfrm>
+      </p:grpSpPr>
+      <p:sp>
+        <p:nvSpPr>
+          <p:cNvPr id="2" name="Title 1"/>
+          <p:cNvSpPr>
+            <a:spLocks noGrp="1"/>
+          </p:cNvSpPr>
+          <p:nvPr>
+            <p:ph type="title"/>
+          </p:nvPr>
+        </p:nvSpPr>
+        <p:spPr/>
+        <p:txBody>
+          <a:bodyPr/>
+          <a:lstStyle/>
+          <a:p>
+            <a:r>
+              <a:rPr lang="en-US" dirty="0" smtClean="0"/>
+              <a:t>Activity: Complex case management</a:t>
+            </a:r>
+            <a:endParaRPr lang="en-US" dirty="0"/>
+          </a:p>
+        </p:txBody>
+      </p:sp>
+      <p:sp>
+        <p:nvSpPr>
+          <p:cNvPr id="3" name="Content Placeholder 2"/>
+          <p:cNvSpPr>
+            <a:spLocks noGrp="1"/>
+          </p:cNvSpPr>
+          <p:nvPr>
+            <p:ph idx="1"/>
+          </p:nvPr>
+        </p:nvSpPr>
+        <p:spPr/>
+        <p:txBody>
+          <a:bodyPr/>
+          <a:lstStyle/>
+          <a:p>
+            <a:r>
+              <a:rPr lang="en-US" dirty="0" smtClean="0"/>
+              <a:t>A community health worker needs to </a:t>
+            </a:r>
+            <a:r>
+              <a:rPr lang="en-US" dirty="0" smtClean="0"/>
+              <a:t>create a case for a mother and her baby, create a form that creates both those cases in a single form</a:t>
+            </a:r>
+            <a:endParaRPr lang="en-US" dirty="0" smtClean="0"/>
+          </a:p>
+          <a:p>
+            <a:r>
+              <a:rPr lang="en-US" dirty="0" smtClean="0"/>
+              <a:t>Workers </a:t>
+            </a:r>
+            <a:r>
+              <a:rPr lang="en-US" dirty="0" smtClean="0"/>
+              <a:t>need to visit districts, but we do not want them to overlap. Build a case sharing application that ensures that workers see where other workers have visited.</a:t>
+            </a:r>
+          </a:p>
+          <a:p>
+            <a:r>
+              <a:rPr lang="en-US" dirty="0" smtClean="0"/>
+              <a:t>Create your own</a:t>
+            </a:r>
+            <a:r>
+              <a:rPr lang="en-US" dirty="0" smtClean="0"/>
+              <a:t>!</a:t>
+            </a:r>
+          </a:p>
+          <a:p>
+            <a:endParaRPr lang="en-US" dirty="0" smtClean="0"/>
+          </a:p>
+          <a:p>
+            <a:pPr marL="0" indent="0">
+              <a:buNone/>
+            </a:pPr>
+            <a:r>
+              <a:rPr lang="en-US" dirty="0" smtClean="0"/>
+              <a:t>Incorporate a nice case list and case detail!</a:t>
+            </a:r>
+          </a:p>
+          <a:p>
+            <a:pPr marL="0" indent="0">
+              <a:buNone/>
+            </a:pPr>
+            <a:endParaRPr lang="en-US" dirty="0"/>
+          </a:p>
+          <a:p>
+            <a:pPr marL="0" indent="0">
+              <a:buNone/>
+            </a:pPr>
+            <a:r>
+              <a:rPr lang="en-US" dirty="0"/>
+              <a:t>Docs: </a:t>
+            </a:r>
+            <a:r>
+              <a:rPr lang="en-US" dirty="0">
+                <a:hlinkClick r:id="rId2"/>
+              </a:rPr>
+              <a:t>http://</a:t>
+            </a:r>
+            <a:r>
+              <a:rPr lang="en-US" dirty="0" smtClean="0">
+                <a:hlinkClick r:id="rId2"/>
+              </a:rPr>
+              <a:t>bit.ly/1lnZhr1</a:t>
+            </a:r>
+            <a:endParaRPr lang="en-US" dirty="0" smtClean="0"/>
+          </a:p>
+          <a:p>
+            <a:pPr marL="0" indent="0">
+              <a:buNone/>
+            </a:pPr>
+            <a:endParaRPr lang="en-US" dirty="0"/>
+          </a:p>
+        </p:txBody>
+      </p:sp>
+    </p:spTree>
+    <p:extLst>
+      <p:ext uri="{BB962C8B-B14F-4D97-AF65-F5344CB8AC3E}">
+        <p14:creationId xmlns:p14="http://schemas.microsoft.com/office/powerpoint/2010/main" val="796572541"/>
+      </p:ext>
+    </p:extLst>
+  </p:cSld>
+  <p:clrMapOvr>
+    <a:masterClrMapping/>
+  </p:clrMapOvr>
 </p:sld>
 </file>
 
@@ -2645,7 +3180,7 @@
           </p:nvPr>
         </p:nvPicPr>
         <p:blipFill>
-          <a:blip r:embed="rId2">
+          <a:blip r:embed="rId3">
             <a:extLst>
               <a:ext uri="{28A0092B-C50C-407E-A947-70E740481C1C}">
                 <a14:useLocalDpi xmlns:a14="http://schemas.microsoft.com/office/drawing/2010/main" val="0"/>
@@ -2796,20 +3331,259 @@
             <p:ph type="title"/>
           </p:nvPr>
         </p:nvSpPr>
-        <p:spPr>
-          <a:xfrm>
-            <a:off x="457200" y="3416969"/>
-            <a:ext cx="8229600" cy="457200"/>
-          </a:xfrm>
-        </p:spPr>
+        <p:spPr/>
         <p:txBody>
           <a:bodyPr/>
           <a:lstStyle/>
           <a:p>
-            <a:pPr algn="ctr"/>
             <a:r>
               <a:rPr lang="en-US" dirty="0" smtClean="0"/>
-              <a:t>Let’s look at HQ</a:t>
+              <a:t>Theory behind cases</a:t>
+            </a:r>
+            <a:endParaRPr lang="en-US" dirty="0"/>
+          </a:p>
+        </p:txBody>
+      </p:sp>
+      <p:sp>
+        <p:nvSpPr>
+          <p:cNvPr id="3" name="Content Placeholder 2"/>
+          <p:cNvSpPr>
+            <a:spLocks noGrp="1"/>
+          </p:cNvSpPr>
+          <p:nvPr>
+            <p:ph idx="1"/>
+          </p:nvPr>
+        </p:nvSpPr>
+        <p:spPr>
+          <a:xfrm>
+            <a:off x="457200" y="990600"/>
+            <a:ext cx="8229600" cy="753979"/>
+          </a:xfrm>
+        </p:spPr>
+        <p:txBody>
+          <a:bodyPr/>
+          <a:lstStyle/>
+          <a:p>
+            <a:r>
+              <a:rPr lang="en-US" dirty="0" smtClean="0"/>
+              <a:t>Cases are built from forms and can always be “rebuilt”</a:t>
+            </a:r>
+            <a:endParaRPr lang="en-US" dirty="0"/>
+          </a:p>
+        </p:txBody>
+      </p:sp>
+      <p:pic>
+        <p:nvPicPr>
+          <p:cNvPr id="4" name="Content Placeholder 3"/>
+          <p:cNvPicPr>
+            <a:picLocks noChangeAspect="1"/>
+          </p:cNvPicPr>
+          <p:nvPr/>
+        </p:nvPicPr>
+        <p:blipFill>
+          <a:blip r:embed="rId3">
+            <a:extLst>
+              <a:ext uri="{28A0092B-C50C-407E-A947-70E740481C1C}">
+                <a14:useLocalDpi xmlns:a14="http://schemas.microsoft.com/office/drawing/2010/main" val="0"/>
+              </a:ext>
+            </a:extLst>
+          </a:blip>
+          <a:stretch>
+            <a:fillRect/>
+          </a:stretch>
+        </p:blipFill>
+        <p:spPr bwMode="auto">
+          <a:xfrm>
+            <a:off x="2348214" y="1602209"/>
+            <a:ext cx="1367589" cy="1367589"/>
+          </a:xfrm>
+          <a:prstGeom prst="rect">
+            <a:avLst/>
+          </a:prstGeom>
+          <a:noFill/>
+          <a:ln w="9525">
+            <a:noFill/>
+            <a:miter lim="800000"/>
+            <a:headEnd/>
+            <a:tailEnd/>
+          </a:ln>
+        </p:spPr>
+      </p:pic>
+      <p:pic>
+        <p:nvPicPr>
+          <p:cNvPr id="5" name="Picture 4"/>
+          <p:cNvPicPr>
+            <a:picLocks noChangeAspect="1"/>
+          </p:cNvPicPr>
+          <p:nvPr/>
+        </p:nvPicPr>
+        <p:blipFill>
+          <a:blip r:embed="rId4">
+            <a:extLst>
+              <a:ext uri="{28A0092B-C50C-407E-A947-70E740481C1C}">
+                <a14:useLocalDpi xmlns:a14="http://schemas.microsoft.com/office/drawing/2010/main" val="0"/>
+              </a:ext>
+            </a:extLst>
+          </a:blip>
+          <a:stretch>
+            <a:fillRect/>
+          </a:stretch>
+        </p:blipFill>
+        <p:spPr>
+          <a:xfrm>
+            <a:off x="1660358" y="4884824"/>
+            <a:ext cx="1540042" cy="1540042"/>
+          </a:xfrm>
+          <a:prstGeom prst="rect">
+            <a:avLst/>
+          </a:prstGeom>
+        </p:spPr>
+      </p:pic>
+      <p:pic>
+        <p:nvPicPr>
+          <p:cNvPr id="6" name="Picture 5"/>
+          <p:cNvPicPr>
+            <a:picLocks noChangeAspect="1"/>
+          </p:cNvPicPr>
+          <p:nvPr/>
+        </p:nvPicPr>
+        <p:blipFill>
+          <a:blip r:embed="rId4">
+            <a:extLst>
+              <a:ext uri="{28A0092B-C50C-407E-A947-70E740481C1C}">
+                <a14:useLocalDpi xmlns:a14="http://schemas.microsoft.com/office/drawing/2010/main" val="0"/>
+              </a:ext>
+            </a:extLst>
+          </a:blip>
+          <a:stretch>
+            <a:fillRect/>
+          </a:stretch>
+        </p:blipFill>
+        <p:spPr>
+          <a:xfrm>
+            <a:off x="3557337" y="4884824"/>
+            <a:ext cx="1540042" cy="1540042"/>
+          </a:xfrm>
+          <a:prstGeom prst="rect">
+            <a:avLst/>
+          </a:prstGeom>
+        </p:spPr>
+      </p:pic>
+      <p:pic>
+        <p:nvPicPr>
+          <p:cNvPr id="7" name="Picture 6"/>
+          <p:cNvPicPr>
+            <a:picLocks noChangeAspect="1"/>
+          </p:cNvPicPr>
+          <p:nvPr/>
+        </p:nvPicPr>
+        <p:blipFill>
+          <a:blip r:embed="rId4">
+            <a:extLst>
+              <a:ext uri="{28A0092B-C50C-407E-A947-70E740481C1C}">
+                <a14:useLocalDpi xmlns:a14="http://schemas.microsoft.com/office/drawing/2010/main" val="0"/>
+              </a:ext>
+            </a:extLst>
+          </a:blip>
+          <a:stretch>
+            <a:fillRect/>
+          </a:stretch>
+        </p:blipFill>
+        <p:spPr>
+          <a:xfrm>
+            <a:off x="5414211" y="4884824"/>
+            <a:ext cx="1540042" cy="1540042"/>
+          </a:xfrm>
+          <a:prstGeom prst="rect">
+            <a:avLst/>
+          </a:prstGeom>
+        </p:spPr>
+      </p:pic>
+      <p:sp>
+        <p:nvSpPr>
+          <p:cNvPr id="8" name="TextBox 7"/>
+          <p:cNvSpPr txBox="1"/>
+          <p:nvPr/>
+        </p:nvSpPr>
+        <p:spPr>
+          <a:xfrm rot="5400000">
+            <a:off x="1464844" y="3756863"/>
+            <a:ext cx="2103521" cy="372979"/>
+          </a:xfrm>
+          <a:prstGeom prst="rect">
+            <a:avLst/>
+          </a:prstGeom>
+          <a:noFill/>
+        </p:spPr>
+        <p:txBody>
+          <a:bodyPr wrap="square" rtlCol="0">
+            <a:spAutoFit/>
+          </a:bodyPr>
+          <a:lstStyle/>
+          <a:p>
+            <a:r>
+              <a:rPr lang="en-US" dirty="0" smtClean="0"/>
+              <a:t>101110101000101</a:t>
+            </a:r>
+            <a:endParaRPr lang="en-US" dirty="0"/>
+          </a:p>
+        </p:txBody>
+      </p:sp>
+      <p:sp>
+        <p:nvSpPr>
+          <p:cNvPr id="9" name="TextBox 8"/>
+          <p:cNvSpPr txBox="1"/>
+          <p:nvPr/>
+        </p:nvSpPr>
+        <p:spPr>
+          <a:xfrm rot="3876095">
+            <a:off x="2768213" y="3819416"/>
+            <a:ext cx="2103521" cy="372979"/>
+          </a:xfrm>
+          <a:prstGeom prst="rect">
+            <a:avLst/>
+          </a:prstGeom>
+          <a:noFill/>
+        </p:spPr>
+        <p:txBody>
+          <a:bodyPr wrap="square" rtlCol="0">
+            <a:spAutoFit/>
+          </a:bodyPr>
+          <a:lstStyle/>
+          <a:p>
+            <a:r>
+              <a:rPr lang="en-US" dirty="0" smtClean="0"/>
+              <a:t>101110101000101</a:t>
+            </a:r>
+            <a:endParaRPr lang="en-US" dirty="0"/>
+          </a:p>
+        </p:txBody>
+      </p:sp>
+      <p:sp>
+        <p:nvSpPr>
+          <p:cNvPr id="10" name="TextBox 9"/>
+          <p:cNvSpPr txBox="1"/>
+          <p:nvPr/>
+        </p:nvSpPr>
+        <p:spPr>
+          <a:xfrm rot="2601233">
+            <a:off x="4072025" y="3710517"/>
+            <a:ext cx="2103521" cy="372979"/>
+          </a:xfrm>
+          <a:prstGeom prst="rect">
+            <a:avLst/>
+          </a:prstGeom>
+          <a:noFill/>
+        </p:spPr>
+        <p:txBody>
+          <a:bodyPr wrap="square" rtlCol="0">
+            <a:spAutoFit/>
+          </a:bodyPr>
+          <a:lstStyle/>
+          <a:p>
+            <a:r>
+              <a:rPr lang="en-US" dirty="0" smtClean="0"/>
+              <a:t>101110101000101</a:t>
             </a:r>
             <a:endParaRPr lang="en-US" dirty="0"/>
           </a:p>
@@ -2818,7 +3592,7 @@
     </p:spTree>
     <p:extLst>
       <p:ext uri="{BB962C8B-B14F-4D97-AF65-F5344CB8AC3E}">
-        <p14:creationId xmlns:p14="http://schemas.microsoft.com/office/powerpoint/2010/main" val="1223942617"/>
+        <p14:creationId xmlns:p14="http://schemas.microsoft.com/office/powerpoint/2010/main" val="176144701"/>
       </p:ext>
     </p:extLst>
   </p:cSld>
@@ -2862,7 +3636,1445 @@
           <a:p>
             <a:r>
               <a:rPr lang="en-US" dirty="0" smtClean="0"/>
-              <a:t>Activity: Complex case management</a:t>
+              <a:t>Case Sharing</a:t>
+            </a:r>
+            <a:endParaRPr lang="en-US" dirty="0"/>
+          </a:p>
+        </p:txBody>
+      </p:sp>
+      <p:sp>
+        <p:nvSpPr>
+          <p:cNvPr id="3" name="Content Placeholder 2"/>
+          <p:cNvSpPr>
+            <a:spLocks noGrp="1"/>
+          </p:cNvSpPr>
+          <p:nvPr>
+            <p:ph idx="1"/>
+          </p:nvPr>
+        </p:nvSpPr>
+        <p:spPr>
+          <a:xfrm>
+            <a:off x="457200" y="990601"/>
+            <a:ext cx="8229600" cy="669758"/>
+          </a:xfrm>
+        </p:spPr>
+        <p:txBody>
+          <a:bodyPr/>
+          <a:lstStyle/>
+          <a:p>
+            <a:r>
+              <a:rPr lang="en-US" dirty="0" smtClean="0"/>
+              <a:t>Normal case workflow:</a:t>
+            </a:r>
+            <a:endParaRPr lang="en-US" dirty="0"/>
+          </a:p>
+        </p:txBody>
+      </p:sp>
+      <p:pic>
+        <p:nvPicPr>
+          <p:cNvPr id="4" name="Picture 3"/>
+          <p:cNvPicPr>
+            <a:picLocks noChangeAspect="1"/>
+          </p:cNvPicPr>
+          <p:nvPr/>
+        </p:nvPicPr>
+        <p:blipFill>
+          <a:blip r:embed="rId2">
+            <a:extLst>
+              <a:ext uri="{28A0092B-C50C-407E-A947-70E740481C1C}">
+                <a14:useLocalDpi xmlns:a14="http://schemas.microsoft.com/office/drawing/2010/main" val="0"/>
+              </a:ext>
+            </a:extLst>
+          </a:blip>
+          <a:stretch>
+            <a:fillRect/>
+          </a:stretch>
+        </p:blipFill>
+        <p:spPr>
+          <a:xfrm>
+            <a:off x="1094873" y="2671011"/>
+            <a:ext cx="1130968" cy="1130968"/>
+          </a:xfrm>
+          <a:prstGeom prst="rect">
+            <a:avLst/>
+          </a:prstGeom>
+        </p:spPr>
+      </p:pic>
+      <p:pic>
+        <p:nvPicPr>
+          <p:cNvPr id="5" name="Picture 4"/>
+          <p:cNvPicPr>
+            <a:picLocks noChangeAspect="1"/>
+          </p:cNvPicPr>
+          <p:nvPr/>
+        </p:nvPicPr>
+        <p:blipFill>
+          <a:blip r:embed="rId3">
+            <a:extLst>
+              <a:ext uri="{28A0092B-C50C-407E-A947-70E740481C1C}">
+                <a14:useLocalDpi xmlns:a14="http://schemas.microsoft.com/office/drawing/2010/main" val="0"/>
+              </a:ext>
+            </a:extLst>
+          </a:blip>
+          <a:stretch>
+            <a:fillRect/>
+          </a:stretch>
+        </p:blipFill>
+        <p:spPr>
+          <a:xfrm>
+            <a:off x="652713" y="4383141"/>
+            <a:ext cx="2015288" cy="2015288"/>
+          </a:xfrm>
+          <a:prstGeom prst="rect">
+            <a:avLst/>
+          </a:prstGeom>
+        </p:spPr>
+      </p:pic>
+      <p:sp>
+        <p:nvSpPr>
+          <p:cNvPr id="6" name="TextBox 5"/>
+          <p:cNvSpPr txBox="1"/>
+          <p:nvPr/>
+        </p:nvSpPr>
+        <p:spPr>
+          <a:xfrm>
+            <a:off x="962525" y="3871799"/>
+            <a:ext cx="1395664" cy="369332"/>
+          </a:xfrm>
+          <a:prstGeom prst="rect">
+            <a:avLst/>
+          </a:prstGeom>
+          <a:noFill/>
+        </p:spPr>
+        <p:txBody>
+          <a:bodyPr wrap="square" rtlCol="0">
+            <a:spAutoFit/>
+          </a:bodyPr>
+          <a:lstStyle/>
+          <a:p>
+            <a:pPr algn="ctr"/>
+            <a:r>
+              <a:rPr lang="en-US" dirty="0" err="1" smtClean="0"/>
+              <a:t>Susy</a:t>
+            </a:r>
+            <a:endParaRPr lang="en-US" dirty="0"/>
+          </a:p>
+        </p:txBody>
+      </p:sp>
+      <p:sp>
+        <p:nvSpPr>
+          <p:cNvPr id="7" name="TextBox 6"/>
+          <p:cNvSpPr txBox="1"/>
+          <p:nvPr/>
+        </p:nvSpPr>
+        <p:spPr>
+          <a:xfrm>
+            <a:off x="962525" y="6067561"/>
+            <a:ext cx="1395664" cy="369332"/>
+          </a:xfrm>
+          <a:prstGeom prst="rect">
+            <a:avLst/>
+          </a:prstGeom>
+          <a:noFill/>
+        </p:spPr>
+        <p:txBody>
+          <a:bodyPr wrap="square" rtlCol="0">
+            <a:spAutoFit/>
+          </a:bodyPr>
+          <a:lstStyle/>
+          <a:p>
+            <a:pPr algn="ctr"/>
+            <a:r>
+              <a:rPr lang="en-US" dirty="0" smtClean="0"/>
+              <a:t>Bob</a:t>
+            </a:r>
+            <a:endParaRPr lang="en-US" dirty="0"/>
+          </a:p>
+        </p:txBody>
+      </p:sp>
+      <p:pic>
+        <p:nvPicPr>
+          <p:cNvPr id="8" name="Content Placeholder 3"/>
+          <p:cNvPicPr>
+            <a:picLocks noChangeAspect="1"/>
+          </p:cNvPicPr>
+          <p:nvPr/>
+        </p:nvPicPr>
+        <p:blipFill>
+          <a:blip r:embed="rId4">
+            <a:extLst>
+              <a:ext uri="{28A0092B-C50C-407E-A947-70E740481C1C}">
+                <a14:useLocalDpi xmlns:a14="http://schemas.microsoft.com/office/drawing/2010/main" val="0"/>
+              </a:ext>
+            </a:extLst>
+          </a:blip>
+          <a:stretch>
+            <a:fillRect/>
+          </a:stretch>
+        </p:blipFill>
+        <p:spPr bwMode="auto">
+          <a:xfrm>
+            <a:off x="2984835" y="3027948"/>
+            <a:ext cx="417094" cy="417094"/>
+          </a:xfrm>
+          <a:prstGeom prst="rect">
+            <a:avLst/>
+          </a:prstGeom>
+          <a:noFill/>
+          <a:ln w="9525">
+            <a:noFill/>
+            <a:miter lim="800000"/>
+            <a:headEnd/>
+            <a:tailEnd/>
+          </a:ln>
+        </p:spPr>
+      </p:pic>
+      <p:pic>
+        <p:nvPicPr>
+          <p:cNvPr id="9" name="Content Placeholder 3"/>
+          <p:cNvPicPr>
+            <a:picLocks noChangeAspect="1"/>
+          </p:cNvPicPr>
+          <p:nvPr/>
+        </p:nvPicPr>
+        <p:blipFill>
+          <a:blip r:embed="rId4">
+            <a:extLst>
+              <a:ext uri="{28A0092B-C50C-407E-A947-70E740481C1C}">
+                <a14:useLocalDpi xmlns:a14="http://schemas.microsoft.com/office/drawing/2010/main" val="0"/>
+              </a:ext>
+            </a:extLst>
+          </a:blip>
+          <a:stretch>
+            <a:fillRect/>
+          </a:stretch>
+        </p:blipFill>
+        <p:spPr bwMode="auto">
+          <a:xfrm>
+            <a:off x="5400171" y="3027948"/>
+            <a:ext cx="417094" cy="417094"/>
+          </a:xfrm>
+          <a:prstGeom prst="rect">
+            <a:avLst/>
+          </a:prstGeom>
+          <a:noFill/>
+          <a:ln w="9525">
+            <a:noFill/>
+            <a:miter lim="800000"/>
+            <a:headEnd/>
+            <a:tailEnd/>
+          </a:ln>
+        </p:spPr>
+      </p:pic>
+      <p:pic>
+        <p:nvPicPr>
+          <p:cNvPr id="10" name="Content Placeholder 3"/>
+          <p:cNvPicPr>
+            <a:picLocks noChangeAspect="1"/>
+          </p:cNvPicPr>
+          <p:nvPr/>
+        </p:nvPicPr>
+        <p:blipFill>
+          <a:blip r:embed="rId4">
+            <a:extLst>
+              <a:ext uri="{28A0092B-C50C-407E-A947-70E740481C1C}">
+                <a14:useLocalDpi xmlns:a14="http://schemas.microsoft.com/office/drawing/2010/main" val="0"/>
+              </a:ext>
+            </a:extLst>
+          </a:blip>
+          <a:stretch>
+            <a:fillRect/>
+          </a:stretch>
+        </p:blipFill>
+        <p:spPr bwMode="auto">
+          <a:xfrm>
+            <a:off x="4572000" y="3027948"/>
+            <a:ext cx="417094" cy="417094"/>
+          </a:xfrm>
+          <a:prstGeom prst="rect">
+            <a:avLst/>
+          </a:prstGeom>
+          <a:noFill/>
+          <a:ln w="9525">
+            <a:noFill/>
+            <a:miter lim="800000"/>
+            <a:headEnd/>
+            <a:tailEnd/>
+          </a:ln>
+        </p:spPr>
+      </p:pic>
+      <p:pic>
+        <p:nvPicPr>
+          <p:cNvPr id="11" name="Content Placeholder 3"/>
+          <p:cNvPicPr>
+            <a:picLocks noChangeAspect="1"/>
+          </p:cNvPicPr>
+          <p:nvPr/>
+        </p:nvPicPr>
+        <p:blipFill>
+          <a:blip r:embed="rId4">
+            <a:extLst>
+              <a:ext uri="{28A0092B-C50C-407E-A947-70E740481C1C}">
+                <a14:useLocalDpi xmlns:a14="http://schemas.microsoft.com/office/drawing/2010/main" val="0"/>
+              </a:ext>
+            </a:extLst>
+          </a:blip>
+          <a:stretch>
+            <a:fillRect/>
+          </a:stretch>
+        </p:blipFill>
+        <p:spPr bwMode="auto">
+          <a:xfrm>
+            <a:off x="3743829" y="3027948"/>
+            <a:ext cx="417094" cy="417094"/>
+          </a:xfrm>
+          <a:prstGeom prst="rect">
+            <a:avLst/>
+          </a:prstGeom>
+          <a:noFill/>
+          <a:ln w="9525">
+            <a:noFill/>
+            <a:miter lim="800000"/>
+            <a:headEnd/>
+            <a:tailEnd/>
+          </a:ln>
+        </p:spPr>
+      </p:pic>
+      <p:sp>
+        <p:nvSpPr>
+          <p:cNvPr id="12" name="TextBox 11"/>
+          <p:cNvSpPr txBox="1"/>
+          <p:nvPr/>
+        </p:nvSpPr>
+        <p:spPr>
+          <a:xfrm>
+            <a:off x="2777289" y="2581413"/>
+            <a:ext cx="2622881" cy="369332"/>
+          </a:xfrm>
+          <a:prstGeom prst="rect">
+            <a:avLst/>
+          </a:prstGeom>
+          <a:noFill/>
+        </p:spPr>
+        <p:txBody>
+          <a:bodyPr wrap="square" rtlCol="0">
+            <a:spAutoFit/>
+          </a:bodyPr>
+          <a:lstStyle/>
+          <a:p>
+            <a:pPr algn="ctr"/>
+            <a:r>
+              <a:rPr lang="en-US" dirty="0" err="1" smtClean="0"/>
+              <a:t>Susy’s</a:t>
+            </a:r>
+            <a:r>
+              <a:rPr lang="en-US" dirty="0" smtClean="0"/>
+              <a:t> cases</a:t>
+            </a:r>
+            <a:endParaRPr lang="en-US" dirty="0"/>
+          </a:p>
+        </p:txBody>
+      </p:sp>
+      <p:pic>
+        <p:nvPicPr>
+          <p:cNvPr id="13" name="Content Placeholder 3"/>
+          <p:cNvPicPr>
+            <a:picLocks noChangeAspect="1"/>
+          </p:cNvPicPr>
+          <p:nvPr/>
+        </p:nvPicPr>
+        <p:blipFill>
+          <a:blip r:embed="rId4">
+            <a:extLst>
+              <a:ext uri="{28A0092B-C50C-407E-A947-70E740481C1C}">
+                <a14:useLocalDpi xmlns:a14="http://schemas.microsoft.com/office/drawing/2010/main" val="0"/>
+              </a:ext>
+            </a:extLst>
+          </a:blip>
+          <a:stretch>
+            <a:fillRect/>
+          </a:stretch>
+        </p:blipFill>
+        <p:spPr bwMode="auto">
+          <a:xfrm>
+            <a:off x="2984835" y="5259166"/>
+            <a:ext cx="417094" cy="417094"/>
+          </a:xfrm>
+          <a:prstGeom prst="rect">
+            <a:avLst/>
+          </a:prstGeom>
+          <a:noFill/>
+          <a:ln w="9525">
+            <a:noFill/>
+            <a:miter lim="800000"/>
+            <a:headEnd/>
+            <a:tailEnd/>
+          </a:ln>
+        </p:spPr>
+      </p:pic>
+      <p:pic>
+        <p:nvPicPr>
+          <p:cNvPr id="14" name="Content Placeholder 3"/>
+          <p:cNvPicPr>
+            <a:picLocks noChangeAspect="1"/>
+          </p:cNvPicPr>
+          <p:nvPr/>
+        </p:nvPicPr>
+        <p:blipFill>
+          <a:blip r:embed="rId4">
+            <a:extLst>
+              <a:ext uri="{28A0092B-C50C-407E-A947-70E740481C1C}">
+                <a14:useLocalDpi xmlns:a14="http://schemas.microsoft.com/office/drawing/2010/main" val="0"/>
+              </a:ext>
+            </a:extLst>
+          </a:blip>
+          <a:stretch>
+            <a:fillRect/>
+          </a:stretch>
+        </p:blipFill>
+        <p:spPr bwMode="auto">
+          <a:xfrm>
+            <a:off x="5400171" y="5259166"/>
+            <a:ext cx="417094" cy="417094"/>
+          </a:xfrm>
+          <a:prstGeom prst="rect">
+            <a:avLst/>
+          </a:prstGeom>
+          <a:noFill/>
+          <a:ln w="9525">
+            <a:noFill/>
+            <a:miter lim="800000"/>
+            <a:headEnd/>
+            <a:tailEnd/>
+          </a:ln>
+        </p:spPr>
+      </p:pic>
+      <p:pic>
+        <p:nvPicPr>
+          <p:cNvPr id="15" name="Content Placeholder 3"/>
+          <p:cNvPicPr>
+            <a:picLocks noChangeAspect="1"/>
+          </p:cNvPicPr>
+          <p:nvPr/>
+        </p:nvPicPr>
+        <p:blipFill>
+          <a:blip r:embed="rId4">
+            <a:extLst>
+              <a:ext uri="{28A0092B-C50C-407E-A947-70E740481C1C}">
+                <a14:useLocalDpi xmlns:a14="http://schemas.microsoft.com/office/drawing/2010/main" val="0"/>
+              </a:ext>
+            </a:extLst>
+          </a:blip>
+          <a:stretch>
+            <a:fillRect/>
+          </a:stretch>
+        </p:blipFill>
+        <p:spPr bwMode="auto">
+          <a:xfrm>
+            <a:off x="4572000" y="5259166"/>
+            <a:ext cx="417094" cy="417094"/>
+          </a:xfrm>
+          <a:prstGeom prst="rect">
+            <a:avLst/>
+          </a:prstGeom>
+          <a:noFill/>
+          <a:ln w="9525">
+            <a:noFill/>
+            <a:miter lim="800000"/>
+            <a:headEnd/>
+            <a:tailEnd/>
+          </a:ln>
+        </p:spPr>
+      </p:pic>
+      <p:pic>
+        <p:nvPicPr>
+          <p:cNvPr id="16" name="Content Placeholder 3"/>
+          <p:cNvPicPr>
+            <a:picLocks noChangeAspect="1"/>
+          </p:cNvPicPr>
+          <p:nvPr/>
+        </p:nvPicPr>
+        <p:blipFill>
+          <a:blip r:embed="rId4">
+            <a:extLst>
+              <a:ext uri="{28A0092B-C50C-407E-A947-70E740481C1C}">
+                <a14:useLocalDpi xmlns:a14="http://schemas.microsoft.com/office/drawing/2010/main" val="0"/>
+              </a:ext>
+            </a:extLst>
+          </a:blip>
+          <a:stretch>
+            <a:fillRect/>
+          </a:stretch>
+        </p:blipFill>
+        <p:spPr bwMode="auto">
+          <a:xfrm>
+            <a:off x="3743829" y="5259166"/>
+            <a:ext cx="417094" cy="417094"/>
+          </a:xfrm>
+          <a:prstGeom prst="rect">
+            <a:avLst/>
+          </a:prstGeom>
+          <a:noFill/>
+          <a:ln w="9525">
+            <a:noFill/>
+            <a:miter lim="800000"/>
+            <a:headEnd/>
+            <a:tailEnd/>
+          </a:ln>
+        </p:spPr>
+      </p:pic>
+      <p:sp>
+        <p:nvSpPr>
+          <p:cNvPr id="17" name="TextBox 16"/>
+          <p:cNvSpPr txBox="1"/>
+          <p:nvPr/>
+        </p:nvSpPr>
+        <p:spPr>
+          <a:xfrm>
+            <a:off x="2777289" y="4812631"/>
+            <a:ext cx="2622881" cy="369332"/>
+          </a:xfrm>
+          <a:prstGeom prst="rect">
+            <a:avLst/>
+          </a:prstGeom>
+          <a:noFill/>
+        </p:spPr>
+        <p:txBody>
+          <a:bodyPr wrap="square" rtlCol="0">
+            <a:spAutoFit/>
+          </a:bodyPr>
+          <a:lstStyle/>
+          <a:p>
+            <a:pPr algn="ctr"/>
+            <a:r>
+              <a:rPr lang="en-US" dirty="0" smtClean="0"/>
+              <a:t>Bob’s cases</a:t>
+            </a:r>
+            <a:endParaRPr lang="en-US" dirty="0"/>
+          </a:p>
+        </p:txBody>
+      </p:sp>
+    </p:spTree>
+    <p:extLst>
+      <p:ext uri="{BB962C8B-B14F-4D97-AF65-F5344CB8AC3E}">
+        <p14:creationId xmlns:p14="http://schemas.microsoft.com/office/powerpoint/2010/main" val="1828619700"/>
+      </p:ext>
+    </p:extLst>
+  </p:cSld>
+  <p:clrMapOvr>
+    <a:masterClrMapping/>
+  </p:clrMapOvr>
+</p:sld>
+</file>
+
+<file path=ppt/slides/slide6.xml><?xml version="1.0" encoding="utf-8"?>
+<p:sld xmlns:a="http://schemas.openxmlformats.org/drawingml/2006/main" xmlns:r="http://schemas.openxmlformats.org/officeDocument/2006/relationships" xmlns:p="http://schemas.openxmlformats.org/presentationml/2006/main">
+  <p:cSld>
+    <p:spTree>
+      <p:nvGrpSpPr>
+        <p:cNvPr id="1" name=""/>
+        <p:cNvGrpSpPr/>
+        <p:nvPr/>
+      </p:nvGrpSpPr>
+      <p:grpSpPr>
+        <a:xfrm>
+          <a:off x="0" y="0"/>
+          <a:ext cx="0" cy="0"/>
+          <a:chOff x="0" y="0"/>
+          <a:chExt cx="0" cy="0"/>
+        </a:xfrm>
+      </p:grpSpPr>
+      <p:sp>
+        <p:nvSpPr>
+          <p:cNvPr id="2" name="Title 1"/>
+          <p:cNvSpPr>
+            <a:spLocks noGrp="1"/>
+          </p:cNvSpPr>
+          <p:nvPr>
+            <p:ph type="title"/>
+          </p:nvPr>
+        </p:nvSpPr>
+        <p:spPr/>
+        <p:txBody>
+          <a:bodyPr/>
+          <a:lstStyle/>
+          <a:p>
+            <a:r>
+              <a:rPr lang="en-US" dirty="0" smtClean="0"/>
+              <a:t>Case Sharing</a:t>
+            </a:r>
+            <a:endParaRPr lang="en-US" dirty="0"/>
+          </a:p>
+        </p:txBody>
+      </p:sp>
+      <p:sp>
+        <p:nvSpPr>
+          <p:cNvPr id="3" name="Content Placeholder 2"/>
+          <p:cNvSpPr>
+            <a:spLocks noGrp="1"/>
+          </p:cNvSpPr>
+          <p:nvPr>
+            <p:ph idx="1"/>
+          </p:nvPr>
+        </p:nvSpPr>
+        <p:spPr>
+          <a:xfrm>
+            <a:off x="457200" y="990601"/>
+            <a:ext cx="8229600" cy="669758"/>
+          </a:xfrm>
+        </p:spPr>
+        <p:txBody>
+          <a:bodyPr/>
+          <a:lstStyle/>
+          <a:p>
+            <a:r>
+              <a:rPr lang="en-US" dirty="0" smtClean="0"/>
+              <a:t>Case sharing case workflow:</a:t>
+            </a:r>
+            <a:endParaRPr lang="en-US" dirty="0"/>
+          </a:p>
+        </p:txBody>
+      </p:sp>
+      <p:pic>
+        <p:nvPicPr>
+          <p:cNvPr id="4" name="Picture 3"/>
+          <p:cNvPicPr>
+            <a:picLocks noChangeAspect="1"/>
+          </p:cNvPicPr>
+          <p:nvPr/>
+        </p:nvPicPr>
+        <p:blipFill>
+          <a:blip r:embed="rId2">
+            <a:extLst>
+              <a:ext uri="{28A0092B-C50C-407E-A947-70E740481C1C}">
+                <a14:useLocalDpi xmlns:a14="http://schemas.microsoft.com/office/drawing/2010/main" val="0"/>
+              </a:ext>
+            </a:extLst>
+          </a:blip>
+          <a:stretch>
+            <a:fillRect/>
+          </a:stretch>
+        </p:blipFill>
+        <p:spPr>
+          <a:xfrm>
+            <a:off x="1094873" y="2671011"/>
+            <a:ext cx="1130968" cy="1130968"/>
+          </a:xfrm>
+          <a:prstGeom prst="rect">
+            <a:avLst/>
+          </a:prstGeom>
+        </p:spPr>
+      </p:pic>
+      <p:pic>
+        <p:nvPicPr>
+          <p:cNvPr id="5" name="Picture 4"/>
+          <p:cNvPicPr>
+            <a:picLocks noChangeAspect="1"/>
+          </p:cNvPicPr>
+          <p:nvPr/>
+        </p:nvPicPr>
+        <p:blipFill>
+          <a:blip r:embed="rId3">
+            <a:extLst>
+              <a:ext uri="{28A0092B-C50C-407E-A947-70E740481C1C}">
+                <a14:useLocalDpi xmlns:a14="http://schemas.microsoft.com/office/drawing/2010/main" val="0"/>
+              </a:ext>
+            </a:extLst>
+          </a:blip>
+          <a:stretch>
+            <a:fillRect/>
+          </a:stretch>
+        </p:blipFill>
+        <p:spPr>
+          <a:xfrm>
+            <a:off x="649706" y="4251522"/>
+            <a:ext cx="2015288" cy="2015288"/>
+          </a:xfrm>
+          <a:prstGeom prst="rect">
+            <a:avLst/>
+          </a:prstGeom>
+        </p:spPr>
+      </p:pic>
+      <p:sp>
+        <p:nvSpPr>
+          <p:cNvPr id="6" name="TextBox 5"/>
+          <p:cNvSpPr txBox="1"/>
+          <p:nvPr/>
+        </p:nvSpPr>
+        <p:spPr>
+          <a:xfrm>
+            <a:off x="962525" y="3871799"/>
+            <a:ext cx="1395664" cy="369332"/>
+          </a:xfrm>
+          <a:prstGeom prst="rect">
+            <a:avLst/>
+          </a:prstGeom>
+          <a:noFill/>
+        </p:spPr>
+        <p:txBody>
+          <a:bodyPr wrap="square" rtlCol="0">
+            <a:spAutoFit/>
+          </a:bodyPr>
+          <a:lstStyle/>
+          <a:p>
+            <a:pPr algn="ctr"/>
+            <a:r>
+              <a:rPr lang="en-US" dirty="0" err="1" smtClean="0"/>
+              <a:t>Susy</a:t>
+            </a:r>
+            <a:endParaRPr lang="en-US" dirty="0"/>
+          </a:p>
+        </p:txBody>
+      </p:sp>
+      <p:sp>
+        <p:nvSpPr>
+          <p:cNvPr id="7" name="TextBox 6"/>
+          <p:cNvSpPr txBox="1"/>
+          <p:nvPr/>
+        </p:nvSpPr>
+        <p:spPr>
+          <a:xfrm>
+            <a:off x="962525" y="6067561"/>
+            <a:ext cx="1395664" cy="369332"/>
+          </a:xfrm>
+          <a:prstGeom prst="rect">
+            <a:avLst/>
+          </a:prstGeom>
+          <a:noFill/>
+        </p:spPr>
+        <p:txBody>
+          <a:bodyPr wrap="square" rtlCol="0">
+            <a:spAutoFit/>
+          </a:bodyPr>
+          <a:lstStyle/>
+          <a:p>
+            <a:pPr algn="ctr"/>
+            <a:r>
+              <a:rPr lang="en-US" dirty="0" smtClean="0"/>
+              <a:t>Bob</a:t>
+            </a:r>
+            <a:endParaRPr lang="en-US" dirty="0"/>
+          </a:p>
+        </p:txBody>
+      </p:sp>
+      <p:pic>
+        <p:nvPicPr>
+          <p:cNvPr id="13" name="Content Placeholder 3"/>
+          <p:cNvPicPr>
+            <a:picLocks noChangeAspect="1"/>
+          </p:cNvPicPr>
+          <p:nvPr/>
+        </p:nvPicPr>
+        <p:blipFill>
+          <a:blip r:embed="rId4">
+            <a:extLst>
+              <a:ext uri="{28A0092B-C50C-407E-A947-70E740481C1C}">
+                <a14:useLocalDpi xmlns:a14="http://schemas.microsoft.com/office/drawing/2010/main" val="0"/>
+              </a:ext>
+            </a:extLst>
+          </a:blip>
+          <a:stretch>
+            <a:fillRect/>
+          </a:stretch>
+        </p:blipFill>
+        <p:spPr bwMode="auto">
+          <a:xfrm>
+            <a:off x="2984835" y="5259166"/>
+            <a:ext cx="417094" cy="417094"/>
+          </a:xfrm>
+          <a:prstGeom prst="rect">
+            <a:avLst/>
+          </a:prstGeom>
+          <a:noFill/>
+          <a:ln w="9525">
+            <a:noFill/>
+            <a:miter lim="800000"/>
+            <a:headEnd/>
+            <a:tailEnd/>
+          </a:ln>
+        </p:spPr>
+      </p:pic>
+      <p:pic>
+        <p:nvPicPr>
+          <p:cNvPr id="14" name="Content Placeholder 3"/>
+          <p:cNvPicPr>
+            <a:picLocks noChangeAspect="1"/>
+          </p:cNvPicPr>
+          <p:nvPr/>
+        </p:nvPicPr>
+        <p:blipFill>
+          <a:blip r:embed="rId4">
+            <a:extLst>
+              <a:ext uri="{28A0092B-C50C-407E-A947-70E740481C1C}">
+                <a14:useLocalDpi xmlns:a14="http://schemas.microsoft.com/office/drawing/2010/main" val="0"/>
+              </a:ext>
+            </a:extLst>
+          </a:blip>
+          <a:stretch>
+            <a:fillRect/>
+          </a:stretch>
+        </p:blipFill>
+        <p:spPr bwMode="auto">
+          <a:xfrm>
+            <a:off x="5307929" y="5259166"/>
+            <a:ext cx="417094" cy="417094"/>
+          </a:xfrm>
+          <a:prstGeom prst="rect">
+            <a:avLst/>
+          </a:prstGeom>
+          <a:noFill/>
+          <a:ln w="9525">
+            <a:noFill/>
+            <a:miter lim="800000"/>
+            <a:headEnd/>
+            <a:tailEnd/>
+          </a:ln>
+        </p:spPr>
+      </p:pic>
+      <p:pic>
+        <p:nvPicPr>
+          <p:cNvPr id="15" name="Content Placeholder 3"/>
+          <p:cNvPicPr>
+            <a:picLocks noChangeAspect="1"/>
+          </p:cNvPicPr>
+          <p:nvPr/>
+        </p:nvPicPr>
+        <p:blipFill>
+          <a:blip r:embed="rId4">
+            <a:extLst>
+              <a:ext uri="{28A0092B-C50C-407E-A947-70E740481C1C}">
+                <a14:useLocalDpi xmlns:a14="http://schemas.microsoft.com/office/drawing/2010/main" val="0"/>
+              </a:ext>
+            </a:extLst>
+          </a:blip>
+          <a:stretch>
+            <a:fillRect/>
+          </a:stretch>
+        </p:blipFill>
+        <p:spPr bwMode="auto">
+          <a:xfrm>
+            <a:off x="4572000" y="5259166"/>
+            <a:ext cx="417094" cy="417094"/>
+          </a:xfrm>
+          <a:prstGeom prst="rect">
+            <a:avLst/>
+          </a:prstGeom>
+          <a:noFill/>
+          <a:ln w="9525">
+            <a:noFill/>
+            <a:miter lim="800000"/>
+            <a:headEnd/>
+            <a:tailEnd/>
+          </a:ln>
+        </p:spPr>
+      </p:pic>
+      <p:pic>
+        <p:nvPicPr>
+          <p:cNvPr id="16" name="Content Placeholder 3"/>
+          <p:cNvPicPr>
+            <a:picLocks noChangeAspect="1"/>
+          </p:cNvPicPr>
+          <p:nvPr/>
+        </p:nvPicPr>
+        <p:blipFill>
+          <a:blip r:embed="rId4">
+            <a:extLst>
+              <a:ext uri="{28A0092B-C50C-407E-A947-70E740481C1C}">
+                <a14:useLocalDpi xmlns:a14="http://schemas.microsoft.com/office/drawing/2010/main" val="0"/>
+              </a:ext>
+            </a:extLst>
+          </a:blip>
+          <a:stretch>
+            <a:fillRect/>
+          </a:stretch>
+        </p:blipFill>
+        <p:spPr bwMode="auto">
+          <a:xfrm>
+            <a:off x="3743829" y="5259166"/>
+            <a:ext cx="417094" cy="417094"/>
+          </a:xfrm>
+          <a:prstGeom prst="rect">
+            <a:avLst/>
+          </a:prstGeom>
+          <a:noFill/>
+          <a:ln w="9525">
+            <a:noFill/>
+            <a:miter lim="800000"/>
+            <a:headEnd/>
+            <a:tailEnd/>
+          </a:ln>
+        </p:spPr>
+      </p:pic>
+      <p:sp>
+        <p:nvSpPr>
+          <p:cNvPr id="17" name="TextBox 16"/>
+          <p:cNvSpPr txBox="1"/>
+          <p:nvPr/>
+        </p:nvSpPr>
+        <p:spPr>
+          <a:xfrm>
+            <a:off x="4638175" y="4800963"/>
+            <a:ext cx="2622881" cy="369332"/>
+          </a:xfrm>
+          <a:prstGeom prst="rect">
+            <a:avLst/>
+          </a:prstGeom>
+          <a:noFill/>
+        </p:spPr>
+        <p:txBody>
+          <a:bodyPr wrap="square" rtlCol="0">
+            <a:spAutoFit/>
+          </a:bodyPr>
+          <a:lstStyle/>
+          <a:p>
+            <a:pPr algn="ctr"/>
+            <a:r>
+              <a:rPr lang="en-US" dirty="0" smtClean="0"/>
+              <a:t>Bob and </a:t>
+            </a:r>
+            <a:r>
+              <a:rPr lang="en-US" dirty="0" err="1" smtClean="0"/>
+              <a:t>Susy’s</a:t>
+            </a:r>
+            <a:r>
+              <a:rPr lang="en-US" dirty="0" smtClean="0"/>
+              <a:t> cases</a:t>
+            </a:r>
+            <a:endParaRPr lang="en-US" dirty="0"/>
+          </a:p>
+        </p:txBody>
+      </p:sp>
+      <p:pic>
+        <p:nvPicPr>
+          <p:cNvPr id="18" name="Content Placeholder 3"/>
+          <p:cNvPicPr>
+            <a:picLocks noChangeAspect="1"/>
+          </p:cNvPicPr>
+          <p:nvPr/>
+        </p:nvPicPr>
+        <p:blipFill>
+          <a:blip r:embed="rId4">
+            <a:extLst>
+              <a:ext uri="{28A0092B-C50C-407E-A947-70E740481C1C}">
+                <a14:useLocalDpi xmlns:a14="http://schemas.microsoft.com/office/drawing/2010/main" val="0"/>
+              </a:ext>
+            </a:extLst>
+          </a:blip>
+          <a:stretch>
+            <a:fillRect/>
+          </a:stretch>
+        </p:blipFill>
+        <p:spPr bwMode="auto">
+          <a:xfrm>
+            <a:off x="5949616" y="5259166"/>
+            <a:ext cx="417094" cy="417094"/>
+          </a:xfrm>
+          <a:prstGeom prst="rect">
+            <a:avLst/>
+          </a:prstGeom>
+          <a:noFill/>
+          <a:ln w="9525">
+            <a:noFill/>
+            <a:miter lim="800000"/>
+            <a:headEnd/>
+            <a:tailEnd/>
+          </a:ln>
+        </p:spPr>
+      </p:pic>
+      <p:pic>
+        <p:nvPicPr>
+          <p:cNvPr id="19" name="Content Placeholder 3"/>
+          <p:cNvPicPr>
+            <a:picLocks noChangeAspect="1"/>
+          </p:cNvPicPr>
+          <p:nvPr/>
+        </p:nvPicPr>
+        <p:blipFill>
+          <a:blip r:embed="rId4">
+            <a:extLst>
+              <a:ext uri="{28A0092B-C50C-407E-A947-70E740481C1C}">
+                <a14:useLocalDpi xmlns:a14="http://schemas.microsoft.com/office/drawing/2010/main" val="0"/>
+              </a:ext>
+            </a:extLst>
+          </a:blip>
+          <a:stretch>
+            <a:fillRect/>
+          </a:stretch>
+        </p:blipFill>
+        <p:spPr bwMode="auto">
+          <a:xfrm>
+            <a:off x="8364952" y="5259166"/>
+            <a:ext cx="417094" cy="417094"/>
+          </a:xfrm>
+          <a:prstGeom prst="rect">
+            <a:avLst/>
+          </a:prstGeom>
+          <a:noFill/>
+          <a:ln w="9525">
+            <a:noFill/>
+            <a:miter lim="800000"/>
+            <a:headEnd/>
+            <a:tailEnd/>
+          </a:ln>
+        </p:spPr>
+      </p:pic>
+      <p:pic>
+        <p:nvPicPr>
+          <p:cNvPr id="20" name="Content Placeholder 3"/>
+          <p:cNvPicPr>
+            <a:picLocks noChangeAspect="1"/>
+          </p:cNvPicPr>
+          <p:nvPr/>
+        </p:nvPicPr>
+        <p:blipFill>
+          <a:blip r:embed="rId4">
+            <a:extLst>
+              <a:ext uri="{28A0092B-C50C-407E-A947-70E740481C1C}">
+                <a14:useLocalDpi xmlns:a14="http://schemas.microsoft.com/office/drawing/2010/main" val="0"/>
+              </a:ext>
+            </a:extLst>
+          </a:blip>
+          <a:stretch>
+            <a:fillRect/>
+          </a:stretch>
+        </p:blipFill>
+        <p:spPr bwMode="auto">
+          <a:xfrm>
+            <a:off x="7536781" y="5259166"/>
+            <a:ext cx="417094" cy="417094"/>
+          </a:xfrm>
+          <a:prstGeom prst="rect">
+            <a:avLst/>
+          </a:prstGeom>
+          <a:noFill/>
+          <a:ln w="9525">
+            <a:noFill/>
+            <a:miter lim="800000"/>
+            <a:headEnd/>
+            <a:tailEnd/>
+          </a:ln>
+        </p:spPr>
+      </p:pic>
+      <p:pic>
+        <p:nvPicPr>
+          <p:cNvPr id="21" name="Content Placeholder 3"/>
+          <p:cNvPicPr>
+            <a:picLocks noChangeAspect="1"/>
+          </p:cNvPicPr>
+          <p:nvPr/>
+        </p:nvPicPr>
+        <p:blipFill>
+          <a:blip r:embed="rId4">
+            <a:extLst>
+              <a:ext uri="{28A0092B-C50C-407E-A947-70E740481C1C}">
+                <a14:useLocalDpi xmlns:a14="http://schemas.microsoft.com/office/drawing/2010/main" val="0"/>
+              </a:ext>
+            </a:extLst>
+          </a:blip>
+          <a:stretch>
+            <a:fillRect/>
+          </a:stretch>
+        </p:blipFill>
+        <p:spPr bwMode="auto">
+          <a:xfrm>
+            <a:off x="6708610" y="5259166"/>
+            <a:ext cx="417094" cy="417094"/>
+          </a:xfrm>
+          <a:prstGeom prst="rect">
+            <a:avLst/>
+          </a:prstGeom>
+          <a:noFill/>
+          <a:ln w="9525">
+            <a:noFill/>
+            <a:miter lim="800000"/>
+            <a:headEnd/>
+            <a:tailEnd/>
+          </a:ln>
+        </p:spPr>
+      </p:pic>
+      <p:pic>
+        <p:nvPicPr>
+          <p:cNvPr id="23" name="Content Placeholder 3"/>
+          <p:cNvPicPr>
+            <a:picLocks noChangeAspect="1"/>
+          </p:cNvPicPr>
+          <p:nvPr/>
+        </p:nvPicPr>
+        <p:blipFill>
+          <a:blip r:embed="rId4">
+            <a:extLst>
+              <a:ext uri="{28A0092B-C50C-407E-A947-70E740481C1C}">
+                <a14:useLocalDpi xmlns:a14="http://schemas.microsoft.com/office/drawing/2010/main" val="0"/>
+              </a:ext>
+            </a:extLst>
+          </a:blip>
+          <a:stretch>
+            <a:fillRect/>
+          </a:stretch>
+        </p:blipFill>
+        <p:spPr bwMode="auto">
+          <a:xfrm>
+            <a:off x="2984835" y="3169864"/>
+            <a:ext cx="417094" cy="417094"/>
+          </a:xfrm>
+          <a:prstGeom prst="rect">
+            <a:avLst/>
+          </a:prstGeom>
+          <a:noFill/>
+          <a:ln w="9525">
+            <a:noFill/>
+            <a:miter lim="800000"/>
+            <a:headEnd/>
+            <a:tailEnd/>
+          </a:ln>
+        </p:spPr>
+      </p:pic>
+      <p:pic>
+        <p:nvPicPr>
+          <p:cNvPr id="24" name="Content Placeholder 3"/>
+          <p:cNvPicPr>
+            <a:picLocks noChangeAspect="1"/>
+          </p:cNvPicPr>
+          <p:nvPr/>
+        </p:nvPicPr>
+        <p:blipFill>
+          <a:blip r:embed="rId4">
+            <a:extLst>
+              <a:ext uri="{28A0092B-C50C-407E-A947-70E740481C1C}">
+                <a14:useLocalDpi xmlns:a14="http://schemas.microsoft.com/office/drawing/2010/main" val="0"/>
+              </a:ext>
+            </a:extLst>
+          </a:blip>
+          <a:stretch>
+            <a:fillRect/>
+          </a:stretch>
+        </p:blipFill>
+        <p:spPr bwMode="auto">
+          <a:xfrm>
+            <a:off x="5307929" y="3169864"/>
+            <a:ext cx="417094" cy="417094"/>
+          </a:xfrm>
+          <a:prstGeom prst="rect">
+            <a:avLst/>
+          </a:prstGeom>
+          <a:noFill/>
+          <a:ln w="9525">
+            <a:noFill/>
+            <a:miter lim="800000"/>
+            <a:headEnd/>
+            <a:tailEnd/>
+          </a:ln>
+        </p:spPr>
+      </p:pic>
+      <p:pic>
+        <p:nvPicPr>
+          <p:cNvPr id="25" name="Content Placeholder 3"/>
+          <p:cNvPicPr>
+            <a:picLocks noChangeAspect="1"/>
+          </p:cNvPicPr>
+          <p:nvPr/>
+        </p:nvPicPr>
+        <p:blipFill>
+          <a:blip r:embed="rId4">
+            <a:extLst>
+              <a:ext uri="{28A0092B-C50C-407E-A947-70E740481C1C}">
+                <a14:useLocalDpi xmlns:a14="http://schemas.microsoft.com/office/drawing/2010/main" val="0"/>
+              </a:ext>
+            </a:extLst>
+          </a:blip>
+          <a:stretch>
+            <a:fillRect/>
+          </a:stretch>
+        </p:blipFill>
+        <p:spPr bwMode="auto">
+          <a:xfrm>
+            <a:off x="4572000" y="3169864"/>
+            <a:ext cx="417094" cy="417094"/>
+          </a:xfrm>
+          <a:prstGeom prst="rect">
+            <a:avLst/>
+          </a:prstGeom>
+          <a:noFill/>
+          <a:ln w="9525">
+            <a:noFill/>
+            <a:miter lim="800000"/>
+            <a:headEnd/>
+            <a:tailEnd/>
+          </a:ln>
+        </p:spPr>
+      </p:pic>
+      <p:pic>
+        <p:nvPicPr>
+          <p:cNvPr id="26" name="Content Placeholder 3"/>
+          <p:cNvPicPr>
+            <a:picLocks noChangeAspect="1"/>
+          </p:cNvPicPr>
+          <p:nvPr/>
+        </p:nvPicPr>
+        <p:blipFill>
+          <a:blip r:embed="rId4">
+            <a:extLst>
+              <a:ext uri="{28A0092B-C50C-407E-A947-70E740481C1C}">
+                <a14:useLocalDpi xmlns:a14="http://schemas.microsoft.com/office/drawing/2010/main" val="0"/>
+              </a:ext>
+            </a:extLst>
+          </a:blip>
+          <a:stretch>
+            <a:fillRect/>
+          </a:stretch>
+        </p:blipFill>
+        <p:spPr bwMode="auto">
+          <a:xfrm>
+            <a:off x="3743829" y="3169864"/>
+            <a:ext cx="417094" cy="417094"/>
+          </a:xfrm>
+          <a:prstGeom prst="rect">
+            <a:avLst/>
+          </a:prstGeom>
+          <a:noFill/>
+          <a:ln w="9525">
+            <a:noFill/>
+            <a:miter lim="800000"/>
+            <a:headEnd/>
+            <a:tailEnd/>
+          </a:ln>
+        </p:spPr>
+      </p:pic>
+      <p:sp>
+        <p:nvSpPr>
+          <p:cNvPr id="27" name="TextBox 26"/>
+          <p:cNvSpPr txBox="1"/>
+          <p:nvPr/>
+        </p:nvSpPr>
+        <p:spPr>
+          <a:xfrm>
+            <a:off x="4638175" y="2711661"/>
+            <a:ext cx="2622881" cy="369332"/>
+          </a:xfrm>
+          <a:prstGeom prst="rect">
+            <a:avLst/>
+          </a:prstGeom>
+          <a:noFill/>
+        </p:spPr>
+        <p:txBody>
+          <a:bodyPr wrap="square" rtlCol="0">
+            <a:spAutoFit/>
+          </a:bodyPr>
+          <a:lstStyle/>
+          <a:p>
+            <a:pPr algn="ctr"/>
+            <a:r>
+              <a:rPr lang="en-US" dirty="0" smtClean="0"/>
+              <a:t>Bob and </a:t>
+            </a:r>
+            <a:r>
+              <a:rPr lang="en-US" dirty="0" err="1" smtClean="0"/>
+              <a:t>Susy’s</a:t>
+            </a:r>
+            <a:r>
+              <a:rPr lang="en-US" dirty="0" smtClean="0"/>
+              <a:t> cases</a:t>
+            </a:r>
+            <a:endParaRPr lang="en-US" dirty="0"/>
+          </a:p>
+        </p:txBody>
+      </p:sp>
+      <p:pic>
+        <p:nvPicPr>
+          <p:cNvPr id="28" name="Content Placeholder 3"/>
+          <p:cNvPicPr>
+            <a:picLocks noChangeAspect="1"/>
+          </p:cNvPicPr>
+          <p:nvPr/>
+        </p:nvPicPr>
+        <p:blipFill>
+          <a:blip r:embed="rId4">
+            <a:extLst>
+              <a:ext uri="{28A0092B-C50C-407E-A947-70E740481C1C}">
+                <a14:useLocalDpi xmlns:a14="http://schemas.microsoft.com/office/drawing/2010/main" val="0"/>
+              </a:ext>
+            </a:extLst>
+          </a:blip>
+          <a:stretch>
+            <a:fillRect/>
+          </a:stretch>
+        </p:blipFill>
+        <p:spPr bwMode="auto">
+          <a:xfrm>
+            <a:off x="5949616" y="3169864"/>
+            <a:ext cx="417094" cy="417094"/>
+          </a:xfrm>
+          <a:prstGeom prst="rect">
+            <a:avLst/>
+          </a:prstGeom>
+          <a:noFill/>
+          <a:ln w="9525">
+            <a:noFill/>
+            <a:miter lim="800000"/>
+            <a:headEnd/>
+            <a:tailEnd/>
+          </a:ln>
+        </p:spPr>
+      </p:pic>
+      <p:pic>
+        <p:nvPicPr>
+          <p:cNvPr id="29" name="Content Placeholder 3"/>
+          <p:cNvPicPr>
+            <a:picLocks noChangeAspect="1"/>
+          </p:cNvPicPr>
+          <p:nvPr/>
+        </p:nvPicPr>
+        <p:blipFill>
+          <a:blip r:embed="rId4">
+            <a:extLst>
+              <a:ext uri="{28A0092B-C50C-407E-A947-70E740481C1C}">
+                <a14:useLocalDpi xmlns:a14="http://schemas.microsoft.com/office/drawing/2010/main" val="0"/>
+              </a:ext>
+            </a:extLst>
+          </a:blip>
+          <a:stretch>
+            <a:fillRect/>
+          </a:stretch>
+        </p:blipFill>
+        <p:spPr bwMode="auto">
+          <a:xfrm>
+            <a:off x="8364952" y="3169864"/>
+            <a:ext cx="417094" cy="417094"/>
+          </a:xfrm>
+          <a:prstGeom prst="rect">
+            <a:avLst/>
+          </a:prstGeom>
+          <a:noFill/>
+          <a:ln w="9525">
+            <a:noFill/>
+            <a:miter lim="800000"/>
+            <a:headEnd/>
+            <a:tailEnd/>
+          </a:ln>
+        </p:spPr>
+      </p:pic>
+      <p:pic>
+        <p:nvPicPr>
+          <p:cNvPr id="30" name="Content Placeholder 3"/>
+          <p:cNvPicPr>
+            <a:picLocks noChangeAspect="1"/>
+          </p:cNvPicPr>
+          <p:nvPr/>
+        </p:nvPicPr>
+        <p:blipFill>
+          <a:blip r:embed="rId4">
+            <a:extLst>
+              <a:ext uri="{28A0092B-C50C-407E-A947-70E740481C1C}">
+                <a14:useLocalDpi xmlns:a14="http://schemas.microsoft.com/office/drawing/2010/main" val="0"/>
+              </a:ext>
+            </a:extLst>
+          </a:blip>
+          <a:stretch>
+            <a:fillRect/>
+          </a:stretch>
+        </p:blipFill>
+        <p:spPr bwMode="auto">
+          <a:xfrm>
+            <a:off x="7536781" y="3169864"/>
+            <a:ext cx="417094" cy="417094"/>
+          </a:xfrm>
+          <a:prstGeom prst="rect">
+            <a:avLst/>
+          </a:prstGeom>
+          <a:noFill/>
+          <a:ln w="9525">
+            <a:noFill/>
+            <a:miter lim="800000"/>
+            <a:headEnd/>
+            <a:tailEnd/>
+          </a:ln>
+        </p:spPr>
+      </p:pic>
+      <p:pic>
+        <p:nvPicPr>
+          <p:cNvPr id="31" name="Content Placeholder 3"/>
+          <p:cNvPicPr>
+            <a:picLocks noChangeAspect="1"/>
+          </p:cNvPicPr>
+          <p:nvPr/>
+        </p:nvPicPr>
+        <p:blipFill>
+          <a:blip r:embed="rId4">
+            <a:extLst>
+              <a:ext uri="{28A0092B-C50C-407E-A947-70E740481C1C}">
+                <a14:useLocalDpi xmlns:a14="http://schemas.microsoft.com/office/drawing/2010/main" val="0"/>
+              </a:ext>
+            </a:extLst>
+          </a:blip>
+          <a:stretch>
+            <a:fillRect/>
+          </a:stretch>
+        </p:blipFill>
+        <p:spPr bwMode="auto">
+          <a:xfrm>
+            <a:off x="6708610" y="3169864"/>
+            <a:ext cx="417094" cy="417094"/>
+          </a:xfrm>
+          <a:prstGeom prst="rect">
+            <a:avLst/>
+          </a:prstGeom>
+          <a:noFill/>
+          <a:ln w="9525">
+            <a:noFill/>
+            <a:miter lim="800000"/>
+            <a:headEnd/>
+            <a:tailEnd/>
+          </a:ln>
+        </p:spPr>
+      </p:pic>
+    </p:spTree>
+    <p:extLst>
+      <p:ext uri="{BB962C8B-B14F-4D97-AF65-F5344CB8AC3E}">
+        <p14:creationId xmlns:p14="http://schemas.microsoft.com/office/powerpoint/2010/main" val="117282628"/>
+      </p:ext>
+    </p:extLst>
+  </p:cSld>
+  <p:clrMapOvr>
+    <a:masterClrMapping/>
+  </p:clrMapOvr>
+</p:sld>
+</file>
+
+<file path=ppt/slides/slide7.xml><?xml version="1.0" encoding="utf-8"?>
+<p:sld xmlns:a="http://schemas.openxmlformats.org/drawingml/2006/main" xmlns:r="http://schemas.openxmlformats.org/officeDocument/2006/relationships" xmlns:p="http://schemas.openxmlformats.org/presentationml/2006/main">
+  <p:cSld>
+    <p:spTree>
+      <p:nvGrpSpPr>
+        <p:cNvPr id="1" name=""/>
+        <p:cNvGrpSpPr/>
+        <p:nvPr/>
+      </p:nvGrpSpPr>
+      <p:grpSpPr>
+        <a:xfrm>
+          <a:off x="0" y="0"/>
+          <a:ext cx="0" cy="0"/>
+          <a:chOff x="0" y="0"/>
+          <a:chExt cx="0" cy="0"/>
+        </a:xfrm>
+      </p:grpSpPr>
+      <p:sp>
+        <p:nvSpPr>
+          <p:cNvPr id="2" name="Title 1"/>
+          <p:cNvSpPr>
+            <a:spLocks noGrp="1"/>
+          </p:cNvSpPr>
+          <p:nvPr>
+            <p:ph type="title"/>
+          </p:nvPr>
+        </p:nvSpPr>
+        <p:spPr/>
+        <p:txBody>
+          <a:bodyPr/>
+          <a:lstStyle/>
+          <a:p>
+            <a:r>
+              <a:rPr lang="en-US" dirty="0" smtClean="0"/>
+              <a:t>Child Cases</a:t>
             </a:r>
             <a:endParaRPr lang="en-US" dirty="0"/>
           </a:p>
@@ -2885,34 +5097,633 @@
           <a:p>
             <a:r>
               <a:rPr lang="en-US" dirty="0" smtClean="0"/>
-              <a:t>A community health worker needs to refer patients to a hospital. Have a form that refers a case to doctors.</a:t>
+              <a:t>Can be used to refer cases</a:t>
             </a:r>
           </a:p>
           <a:p>
             <a:r>
               <a:rPr lang="en-US" dirty="0" smtClean="0"/>
-              <a:t>Farmers and sellers need to keep track food. Farmers need to know how much they have and so do sellers, but their applications will probably look different. Share data between two applications</a:t>
+              <a:t>Avoid creating multiple registrations (mother and child, for example)</a:t>
             </a:r>
           </a:p>
           <a:p>
             <a:r>
               <a:rPr lang="en-US" dirty="0" smtClean="0"/>
-              <a:t>Workers need to visit districts, but we do not want them to overlap. Build a case sharing application that ensures that workers see where other workers have visited.</a:t>
-            </a:r>
-          </a:p>
+              <a:t>Can use a repeat group to create child cases</a:t>
+            </a:r>
+            <a:endParaRPr lang="en-US" dirty="0"/>
+          </a:p>
+        </p:txBody>
+      </p:sp>
+      <p:pic>
+        <p:nvPicPr>
+          <p:cNvPr id="4" name="Content Placeholder 3"/>
+          <p:cNvPicPr>
+            <a:picLocks noChangeAspect="1"/>
+          </p:cNvPicPr>
+          <p:nvPr/>
+        </p:nvPicPr>
+        <p:blipFill>
+          <a:blip r:embed="rId2">
+            <a:extLst>
+              <a:ext uri="{28A0092B-C50C-407E-A947-70E740481C1C}">
+                <a14:useLocalDpi xmlns:a14="http://schemas.microsoft.com/office/drawing/2010/main" val="0"/>
+              </a:ext>
+            </a:extLst>
+          </a:blip>
+          <a:stretch>
+            <a:fillRect/>
+          </a:stretch>
+        </p:blipFill>
+        <p:spPr bwMode="auto">
+          <a:xfrm>
+            <a:off x="3875172" y="3157833"/>
+            <a:ext cx="997618" cy="997618"/>
+          </a:xfrm>
+          <a:prstGeom prst="rect">
+            <a:avLst/>
+          </a:prstGeom>
+          <a:noFill/>
+          <a:ln w="9525">
+            <a:noFill/>
+            <a:miter lim="800000"/>
+            <a:headEnd/>
+            <a:tailEnd/>
+          </a:ln>
+        </p:spPr>
+      </p:pic>
+      <p:pic>
+        <p:nvPicPr>
+          <p:cNvPr id="5" name="Content Placeholder 3"/>
+          <p:cNvPicPr>
+            <a:picLocks noChangeAspect="1"/>
+          </p:cNvPicPr>
+          <p:nvPr/>
+        </p:nvPicPr>
+        <p:blipFill>
+          <a:blip r:embed="rId2">
+            <a:extLst>
+              <a:ext uri="{28A0092B-C50C-407E-A947-70E740481C1C}">
+                <a14:useLocalDpi xmlns:a14="http://schemas.microsoft.com/office/drawing/2010/main" val="0"/>
+              </a:ext>
+            </a:extLst>
+          </a:blip>
+          <a:stretch>
+            <a:fillRect/>
+          </a:stretch>
+        </p:blipFill>
+        <p:spPr bwMode="auto">
+          <a:xfrm>
+            <a:off x="2547688" y="5053262"/>
+            <a:ext cx="469777" cy="469777"/>
+          </a:xfrm>
+          <a:prstGeom prst="rect">
+            <a:avLst/>
+          </a:prstGeom>
+          <a:noFill/>
+          <a:ln w="9525">
+            <a:noFill/>
+            <a:miter lim="800000"/>
+            <a:headEnd/>
+            <a:tailEnd/>
+          </a:ln>
+        </p:spPr>
+      </p:pic>
+      <p:pic>
+        <p:nvPicPr>
+          <p:cNvPr id="6" name="Content Placeholder 3"/>
+          <p:cNvPicPr>
+            <a:picLocks noChangeAspect="1"/>
+          </p:cNvPicPr>
+          <p:nvPr/>
+        </p:nvPicPr>
+        <p:blipFill>
+          <a:blip r:embed="rId2">
+            <a:extLst>
+              <a:ext uri="{28A0092B-C50C-407E-A947-70E740481C1C}">
+                <a14:useLocalDpi xmlns:a14="http://schemas.microsoft.com/office/drawing/2010/main" val="0"/>
+              </a:ext>
+            </a:extLst>
+          </a:blip>
+          <a:stretch>
+            <a:fillRect/>
+          </a:stretch>
+        </p:blipFill>
+        <p:spPr bwMode="auto">
+          <a:xfrm>
+            <a:off x="3405395" y="5053262"/>
+            <a:ext cx="469777" cy="469777"/>
+          </a:xfrm>
+          <a:prstGeom prst="rect">
+            <a:avLst/>
+          </a:prstGeom>
+          <a:noFill/>
+          <a:ln w="9525">
+            <a:noFill/>
+            <a:miter lim="800000"/>
+            <a:headEnd/>
+            <a:tailEnd/>
+          </a:ln>
+        </p:spPr>
+      </p:pic>
+      <p:pic>
+        <p:nvPicPr>
+          <p:cNvPr id="7" name="Content Placeholder 3"/>
+          <p:cNvPicPr>
+            <a:picLocks noChangeAspect="1"/>
+          </p:cNvPicPr>
+          <p:nvPr/>
+        </p:nvPicPr>
+        <p:blipFill>
+          <a:blip r:embed="rId2">
+            <a:extLst>
+              <a:ext uri="{28A0092B-C50C-407E-A947-70E740481C1C}">
+                <a14:useLocalDpi xmlns:a14="http://schemas.microsoft.com/office/drawing/2010/main" val="0"/>
+              </a:ext>
+            </a:extLst>
+          </a:blip>
+          <a:stretch>
+            <a:fillRect/>
+          </a:stretch>
+        </p:blipFill>
+        <p:spPr bwMode="auto">
+          <a:xfrm>
+            <a:off x="4289760" y="5053262"/>
+            <a:ext cx="469777" cy="469777"/>
+          </a:xfrm>
+          <a:prstGeom prst="rect">
+            <a:avLst/>
+          </a:prstGeom>
+          <a:noFill/>
+          <a:ln w="9525">
+            <a:noFill/>
+            <a:miter lim="800000"/>
+            <a:headEnd/>
+            <a:tailEnd/>
+          </a:ln>
+        </p:spPr>
+      </p:pic>
+      <p:pic>
+        <p:nvPicPr>
+          <p:cNvPr id="8" name="Content Placeholder 3"/>
+          <p:cNvPicPr>
+            <a:picLocks noChangeAspect="1"/>
+          </p:cNvPicPr>
+          <p:nvPr/>
+        </p:nvPicPr>
+        <p:blipFill>
+          <a:blip r:embed="rId2">
+            <a:extLst>
+              <a:ext uri="{28A0092B-C50C-407E-A947-70E740481C1C}">
+                <a14:useLocalDpi xmlns:a14="http://schemas.microsoft.com/office/drawing/2010/main" val="0"/>
+              </a:ext>
+            </a:extLst>
+          </a:blip>
+          <a:stretch>
+            <a:fillRect/>
+          </a:stretch>
+        </p:blipFill>
+        <p:spPr bwMode="auto">
+          <a:xfrm>
+            <a:off x="5147467" y="5053262"/>
+            <a:ext cx="469777" cy="469777"/>
+          </a:xfrm>
+          <a:prstGeom prst="rect">
+            <a:avLst/>
+          </a:prstGeom>
+          <a:noFill/>
+          <a:ln w="9525">
+            <a:noFill/>
+            <a:miter lim="800000"/>
+            <a:headEnd/>
+            <a:tailEnd/>
+          </a:ln>
+        </p:spPr>
+      </p:pic>
+      <p:pic>
+        <p:nvPicPr>
+          <p:cNvPr id="9" name="Content Placeholder 3"/>
+          <p:cNvPicPr>
+            <a:picLocks noChangeAspect="1"/>
+          </p:cNvPicPr>
+          <p:nvPr/>
+        </p:nvPicPr>
+        <p:blipFill>
+          <a:blip r:embed="rId2">
+            <a:extLst>
+              <a:ext uri="{28A0092B-C50C-407E-A947-70E740481C1C}">
+                <a14:useLocalDpi xmlns:a14="http://schemas.microsoft.com/office/drawing/2010/main" val="0"/>
+              </a:ext>
+            </a:extLst>
+          </a:blip>
+          <a:stretch>
+            <a:fillRect/>
+          </a:stretch>
+        </p:blipFill>
+        <p:spPr bwMode="auto">
+          <a:xfrm>
+            <a:off x="6057923" y="5053261"/>
+            <a:ext cx="469777" cy="469777"/>
+          </a:xfrm>
+          <a:prstGeom prst="rect">
+            <a:avLst/>
+          </a:prstGeom>
+          <a:noFill/>
+          <a:ln w="9525">
+            <a:noFill/>
+            <a:miter lim="800000"/>
+            <a:headEnd/>
+            <a:tailEnd/>
+          </a:ln>
+        </p:spPr>
+      </p:pic>
+    </p:spTree>
+    <p:extLst>
+      <p:ext uri="{BB962C8B-B14F-4D97-AF65-F5344CB8AC3E}">
+        <p14:creationId xmlns:p14="http://schemas.microsoft.com/office/powerpoint/2010/main" val="1369903510"/>
+      </p:ext>
+    </p:extLst>
+  </p:cSld>
+  <p:clrMapOvr>
+    <a:masterClrMapping/>
+  </p:clrMapOvr>
+</p:sld>
+</file>
+
+<file path=ppt/slides/slide8.xml><?xml version="1.0" encoding="utf-8"?>
+<p:sld xmlns:a="http://schemas.openxmlformats.org/drawingml/2006/main" xmlns:r="http://schemas.openxmlformats.org/officeDocument/2006/relationships" xmlns:p="http://schemas.openxmlformats.org/presentationml/2006/main">
+  <p:cSld>
+    <p:spTree>
+      <p:nvGrpSpPr>
+        <p:cNvPr id="1" name=""/>
+        <p:cNvGrpSpPr/>
+        <p:nvPr/>
+      </p:nvGrpSpPr>
+      <p:grpSpPr>
+        <a:xfrm>
+          <a:off x="0" y="0"/>
+          <a:ext cx="0" cy="0"/>
+          <a:chOff x="0" y="0"/>
+          <a:chExt cx="0" cy="0"/>
+        </a:xfrm>
+      </p:grpSpPr>
+      <p:sp>
+        <p:nvSpPr>
+          <p:cNvPr id="2" name="Title 1"/>
+          <p:cNvSpPr>
+            <a:spLocks noGrp="1"/>
+          </p:cNvSpPr>
+          <p:nvPr>
+            <p:ph type="title"/>
+          </p:nvPr>
+        </p:nvSpPr>
+        <p:spPr/>
+        <p:txBody>
+          <a:bodyPr/>
+          <a:lstStyle/>
           <a:p>
             <a:r>
               <a:rPr lang="en-US" dirty="0" smtClean="0"/>
-              <a:t>Create your own!</a:t>
+              <a:t>Multiple Apps</a:t>
             </a:r>
             <a:endParaRPr lang="en-US" dirty="0"/>
+          </a:p>
+        </p:txBody>
+      </p:sp>
+      <p:sp>
+        <p:nvSpPr>
+          <p:cNvPr id="3" name="Content Placeholder 2"/>
+          <p:cNvSpPr>
+            <a:spLocks noGrp="1"/>
+          </p:cNvSpPr>
+          <p:nvPr>
+            <p:ph idx="1"/>
+          </p:nvPr>
+        </p:nvSpPr>
+        <p:spPr/>
+        <p:txBody>
+          <a:bodyPr/>
+          <a:lstStyle/>
+          <a:p>
+            <a:r>
+              <a:rPr lang="en-US" dirty="0" smtClean="0"/>
+              <a:t>Case Types can be shared across a _domain_. That means case types case be shared in different applications</a:t>
+            </a:r>
+          </a:p>
+        </p:txBody>
+      </p:sp>
+      <p:pic>
+        <p:nvPicPr>
+          <p:cNvPr id="4" name="Content Placeholder 3"/>
+          <p:cNvPicPr>
+            <a:picLocks noChangeAspect="1"/>
+          </p:cNvPicPr>
+          <p:nvPr/>
+        </p:nvPicPr>
+        <p:blipFill>
+          <a:blip r:embed="rId2">
+            <a:extLst>
+              <a:ext uri="{28A0092B-C50C-407E-A947-70E740481C1C}">
+                <a14:useLocalDpi xmlns:a14="http://schemas.microsoft.com/office/drawing/2010/main" val="0"/>
+              </a:ext>
+            </a:extLst>
+          </a:blip>
+          <a:stretch>
+            <a:fillRect/>
+          </a:stretch>
+        </p:blipFill>
+        <p:spPr bwMode="auto">
+          <a:xfrm>
+            <a:off x="3873712" y="2623789"/>
+            <a:ext cx="1195322" cy="1195322"/>
+          </a:xfrm>
+          <a:prstGeom prst="rect">
+            <a:avLst/>
+          </a:prstGeom>
+          <a:noFill/>
+          <a:ln w="9525">
+            <a:noFill/>
+            <a:miter lim="800000"/>
+            <a:headEnd/>
+            <a:tailEnd/>
+          </a:ln>
+        </p:spPr>
+      </p:pic>
+      <p:pic>
+        <p:nvPicPr>
+          <p:cNvPr id="5" name="Picture 4"/>
+          <p:cNvPicPr>
+            <a:picLocks noChangeAspect="1"/>
+          </p:cNvPicPr>
+          <p:nvPr/>
+        </p:nvPicPr>
+        <p:blipFill>
+          <a:blip r:embed="rId3">
+            <a:extLst>
+              <a:ext uri="{28A0092B-C50C-407E-A947-70E740481C1C}">
+                <a14:useLocalDpi xmlns:a14="http://schemas.microsoft.com/office/drawing/2010/main" val="0"/>
+              </a:ext>
+            </a:extLst>
+          </a:blip>
+          <a:stretch>
+            <a:fillRect/>
+          </a:stretch>
+        </p:blipFill>
+        <p:spPr>
+          <a:xfrm>
+            <a:off x="2684046" y="4440198"/>
+            <a:ext cx="1263315" cy="1263315"/>
+          </a:xfrm>
+          <a:prstGeom prst="rect">
+            <a:avLst/>
+          </a:prstGeom>
+        </p:spPr>
+      </p:pic>
+      <p:pic>
+        <p:nvPicPr>
+          <p:cNvPr id="6" name="Picture 5"/>
+          <p:cNvPicPr>
+            <a:picLocks noChangeAspect="1"/>
+          </p:cNvPicPr>
+          <p:nvPr/>
+        </p:nvPicPr>
+        <p:blipFill>
+          <a:blip r:embed="rId3">
+            <a:extLst>
+              <a:ext uri="{28A0092B-C50C-407E-A947-70E740481C1C}">
+                <a14:useLocalDpi xmlns:a14="http://schemas.microsoft.com/office/drawing/2010/main" val="0"/>
+              </a:ext>
+            </a:extLst>
+          </a:blip>
+          <a:stretch>
+            <a:fillRect/>
+          </a:stretch>
+        </p:blipFill>
+        <p:spPr>
+          <a:xfrm>
+            <a:off x="3873712" y="4440198"/>
+            <a:ext cx="1263315" cy="1263315"/>
+          </a:xfrm>
+          <a:prstGeom prst="rect">
+            <a:avLst/>
+          </a:prstGeom>
+        </p:spPr>
+      </p:pic>
+      <p:pic>
+        <p:nvPicPr>
+          <p:cNvPr id="7" name="Picture 6"/>
+          <p:cNvPicPr>
+            <a:picLocks noChangeAspect="1"/>
+          </p:cNvPicPr>
+          <p:nvPr/>
+        </p:nvPicPr>
+        <p:blipFill>
+          <a:blip r:embed="rId3">
+            <a:extLst>
+              <a:ext uri="{28A0092B-C50C-407E-A947-70E740481C1C}">
+                <a14:useLocalDpi xmlns:a14="http://schemas.microsoft.com/office/drawing/2010/main" val="0"/>
+              </a:ext>
+            </a:extLst>
+          </a:blip>
+          <a:stretch>
+            <a:fillRect/>
+          </a:stretch>
+        </p:blipFill>
+        <p:spPr>
+          <a:xfrm>
+            <a:off x="5229269" y="4440197"/>
+            <a:ext cx="1263315" cy="1263315"/>
+          </a:xfrm>
+          <a:prstGeom prst="rect">
+            <a:avLst/>
+          </a:prstGeom>
+        </p:spPr>
+      </p:pic>
+      <p:sp>
+        <p:nvSpPr>
+          <p:cNvPr id="8" name="TextBox 7"/>
+          <p:cNvSpPr txBox="1"/>
+          <p:nvPr/>
+        </p:nvSpPr>
+        <p:spPr>
+          <a:xfrm>
+            <a:off x="2935705" y="3819111"/>
+            <a:ext cx="3296653" cy="369332"/>
+          </a:xfrm>
+          <a:prstGeom prst="rect">
+            <a:avLst/>
+          </a:prstGeom>
+          <a:noFill/>
+        </p:spPr>
+        <p:txBody>
+          <a:bodyPr wrap="square" rtlCol="0">
+            <a:spAutoFit/>
+          </a:bodyPr>
+          <a:lstStyle/>
+          <a:p>
+            <a:pPr algn="ctr"/>
+            <a:r>
+              <a:rPr lang="en-US" smtClean="0"/>
+              <a:t>One case many apps</a:t>
+            </a:r>
+            <a:endParaRPr lang="en-US"/>
           </a:p>
         </p:txBody>
       </p:sp>
     </p:spTree>
     <p:extLst>
       <p:ext uri="{BB962C8B-B14F-4D97-AF65-F5344CB8AC3E}">
-        <p14:creationId xmlns:p14="http://schemas.microsoft.com/office/powerpoint/2010/main" val="796572541"/>
+        <p14:creationId xmlns:p14="http://schemas.microsoft.com/office/powerpoint/2010/main" val="1958452980"/>
+      </p:ext>
+    </p:extLst>
+  </p:cSld>
+  <p:clrMapOvr>
+    <a:masterClrMapping/>
+  </p:clrMapOvr>
+</p:sld>
+</file>
+
+<file path=ppt/slides/slide9.xml><?xml version="1.0" encoding="utf-8"?>
+<p:sld xmlns:a="http://schemas.openxmlformats.org/drawingml/2006/main" xmlns:r="http://schemas.openxmlformats.org/officeDocument/2006/relationships" xmlns:p="http://schemas.openxmlformats.org/presentationml/2006/main">
+  <p:cSld>
+    <p:spTree>
+      <p:nvGrpSpPr>
+        <p:cNvPr id="1" name=""/>
+        <p:cNvGrpSpPr/>
+        <p:nvPr/>
+      </p:nvGrpSpPr>
+      <p:grpSpPr>
+        <a:xfrm>
+          <a:off x="0" y="0"/>
+          <a:ext cx="0" cy="0"/>
+          <a:chOff x="0" y="0"/>
+          <a:chExt cx="0" cy="0"/>
+        </a:xfrm>
+      </p:grpSpPr>
+      <p:sp>
+        <p:nvSpPr>
+          <p:cNvPr id="2" name="Title 1"/>
+          <p:cNvSpPr>
+            <a:spLocks noGrp="1"/>
+          </p:cNvSpPr>
+          <p:nvPr>
+            <p:ph type="title"/>
+          </p:nvPr>
+        </p:nvSpPr>
+        <p:spPr/>
+        <p:txBody>
+          <a:bodyPr/>
+          <a:lstStyle/>
+          <a:p>
+            <a:r>
+              <a:rPr lang="en-US" dirty="0" smtClean="0"/>
+              <a:t>Case List and Case Detail</a:t>
+            </a:r>
+            <a:endParaRPr lang="en-US" dirty="0"/>
+          </a:p>
+        </p:txBody>
+      </p:sp>
+      <p:sp>
+        <p:nvSpPr>
+          <p:cNvPr id="4" name="Content Placeholder 3"/>
+          <p:cNvSpPr>
+            <a:spLocks noGrp="1"/>
+          </p:cNvSpPr>
+          <p:nvPr>
+            <p:ph idx="1"/>
+          </p:nvPr>
+        </p:nvSpPr>
+        <p:spPr/>
+        <p:txBody>
+          <a:bodyPr/>
+          <a:lstStyle/>
+          <a:p>
+            <a:r>
+              <a:rPr lang="en-US" dirty="0" smtClean="0"/>
+              <a:t>Case list is the list of cases to be shown before selecting a case</a:t>
+            </a:r>
+          </a:p>
+          <a:p>
+            <a:pPr lvl="1"/>
+            <a:r>
+              <a:rPr lang="en-US" dirty="0"/>
+              <a:t> </a:t>
+            </a:r>
+            <a:r>
+              <a:rPr lang="en-US" dirty="0" smtClean="0"/>
+              <a:t>Only has one or two case properties</a:t>
+            </a:r>
+          </a:p>
+          <a:p>
+            <a:pPr lvl="1"/>
+            <a:r>
+              <a:rPr lang="en-US" dirty="0"/>
+              <a:t> </a:t>
+            </a:r>
+            <a:r>
+              <a:rPr lang="en-US" dirty="0" smtClean="0"/>
+              <a:t>Can be filtered or sorted based on an </a:t>
+            </a:r>
+            <a:r>
+              <a:rPr lang="en-US" dirty="0" err="1" smtClean="0"/>
+              <a:t>Xpath</a:t>
+            </a:r>
+            <a:r>
+              <a:rPr lang="en-US" dirty="0" smtClean="0"/>
+              <a:t> Expression</a:t>
+            </a:r>
+          </a:p>
+          <a:p>
+            <a:r>
+              <a:rPr lang="en-US" dirty="0" smtClean="0"/>
+              <a:t>Case Detail is the information of the case after clicking on it in the case list</a:t>
+            </a:r>
+          </a:p>
+          <a:p>
+            <a:pPr lvl="1"/>
+            <a:r>
+              <a:rPr lang="en-US" dirty="0"/>
+              <a:t> </a:t>
+            </a:r>
+            <a:r>
+              <a:rPr lang="en-US" dirty="0" smtClean="0"/>
+              <a:t>Often shows more properties</a:t>
+            </a:r>
+          </a:p>
+          <a:p>
+            <a:endParaRPr lang="en-US" dirty="0" smtClean="0"/>
+          </a:p>
+          <a:p>
+            <a:endParaRPr lang="en-US" dirty="0"/>
+          </a:p>
+          <a:p>
+            <a:pPr marL="0" indent="0">
+              <a:buNone/>
+            </a:pPr>
+            <a:r>
+              <a:rPr lang="en-US" dirty="0"/>
+              <a:t>Docs: </a:t>
+            </a:r>
+            <a:r>
+              <a:rPr lang="en-US" dirty="0">
+                <a:hlinkClick r:id="rId2"/>
+              </a:rPr>
+              <a:t>http://</a:t>
+            </a:r>
+            <a:r>
+              <a:rPr lang="en-US" dirty="0" smtClean="0">
+                <a:hlinkClick r:id="rId2"/>
+              </a:rPr>
+              <a:t>bit.ly/1NX8sWv</a:t>
+            </a:r>
+            <a:endParaRPr lang="en-US" dirty="0" smtClean="0"/>
+          </a:p>
+        </p:txBody>
+      </p:sp>
+    </p:spTree>
+    <p:extLst>
+      <p:ext uri="{BB962C8B-B14F-4D97-AF65-F5344CB8AC3E}">
+        <p14:creationId xmlns:p14="http://schemas.microsoft.com/office/powerpoint/2010/main" val="1057301706"/>
       </p:ext>
     </p:extLst>
   </p:cSld>

</xml_diff>